<commit_message>
Update presentation ppt& add pdf
</commit_message>
<xml_diff>
--- a/Report/Presentation Material/Comp3211_GroupProject_Group33_Presentation.pptx
+++ b/Report/Presentation Material/Comp3211_GroupProject_Group33_Presentation.pptx
@@ -259,7 +259,7 @@
   </p:defaultTextStyle>
   <p:extLst>
     <p:ext uri="GoogleSlidesCustomDataVersion2">
-      <go:slidesCustomData xmlns:go="http://customooxmlschemas.google.com/" r:id="rId22" roundtripDataSignature="AMtx7mgisxJvay9N3LZTDec3PsyUrebN+A=="/>
+      <go:slidesCustomData xmlns:go="http://customooxmlschemas.google.com/" r:id="rId22" roundtripDataSignature="AMtx7mgF5ub47YLOwzyQDlfj3QOu3f9xOQ=="/>
     </p:ext>
   </p:extLst>
 </p:presentation>
@@ -878,7 +878,7 @@
   <p:cSld>
     <p:spTree>
       <p:nvGrpSpPr>
-        <p:cNvPr id="137" name="Shape 137"/>
+        <p:cNvPr id="138" name="Shape 138"/>
         <p:cNvGrpSpPr/>
         <p:nvPr/>
       </p:nvGrpSpPr>
@@ -892,7 +892,7 @@
       </p:grpSpPr>
       <p:sp>
         <p:nvSpPr>
-          <p:cNvPr id="138" name="Google Shape;138;p10:notes"/>
+          <p:cNvPr id="139" name="Google Shape;139;p10:notes"/>
           <p:cNvSpPr/>
           <p:nvPr>
             <p:ph idx="2" type="sldImg"/>
@@ -931,7 +931,7 @@
       </p:sp>
       <p:sp>
         <p:nvSpPr>
-          <p:cNvPr id="139" name="Google Shape;139;p10:notes"/>
+          <p:cNvPr id="140" name="Google Shape;140;p10:notes"/>
           <p:cNvSpPr txBox="1"/>
           <p:nvPr>
             <p:ph idx="1" type="body"/>
@@ -982,7 +982,7 @@
       </p:sp>
       <p:sp>
         <p:nvSpPr>
-          <p:cNvPr id="140" name="Google Shape;140;p10:notes"/>
+          <p:cNvPr id="141" name="Google Shape;141;p10:notes"/>
           <p:cNvSpPr txBox="1"/>
           <p:nvPr>
             <p:ph idx="12" type="sldNum"/>
@@ -1053,7 +1053,7 @@
   <p:cSld>
     <p:spTree>
       <p:nvGrpSpPr>
-        <p:cNvPr id="155" name="Shape 155"/>
+        <p:cNvPr id="156" name="Shape 156"/>
         <p:cNvGrpSpPr/>
         <p:nvPr/>
       </p:nvGrpSpPr>
@@ -1067,7 +1067,7 @@
       </p:grpSpPr>
       <p:sp>
         <p:nvSpPr>
-          <p:cNvPr id="156" name="Google Shape;156;p11:notes"/>
+          <p:cNvPr id="157" name="Google Shape;157;p11:notes"/>
           <p:cNvSpPr/>
           <p:nvPr>
             <p:ph idx="2" type="sldImg"/>
@@ -1106,7 +1106,7 @@
       </p:sp>
       <p:sp>
         <p:nvSpPr>
-          <p:cNvPr id="157" name="Google Shape;157;p11:notes"/>
+          <p:cNvPr id="158" name="Google Shape;158;p11:notes"/>
           <p:cNvSpPr txBox="1"/>
           <p:nvPr>
             <p:ph idx="1" type="body"/>
@@ -1157,7 +1157,7 @@
       </p:sp>
       <p:sp>
         <p:nvSpPr>
-          <p:cNvPr id="158" name="Google Shape;158;p11:notes"/>
+          <p:cNvPr id="159" name="Google Shape;159;p11:notes"/>
           <p:cNvSpPr txBox="1"/>
           <p:nvPr>
             <p:ph idx="12" type="sldNum"/>
@@ -1228,7 +1228,7 @@
   <p:cSld>
     <p:spTree>
       <p:nvGrpSpPr>
-        <p:cNvPr id="176" name="Shape 176"/>
+        <p:cNvPr id="177" name="Shape 177"/>
         <p:cNvGrpSpPr/>
         <p:nvPr/>
       </p:nvGrpSpPr>
@@ -1242,7 +1242,7 @@
       </p:grpSpPr>
       <p:sp>
         <p:nvSpPr>
-          <p:cNvPr id="177" name="Google Shape;177;p12:notes"/>
+          <p:cNvPr id="178" name="Google Shape;178;p12:notes"/>
           <p:cNvSpPr/>
           <p:nvPr>
             <p:ph idx="2" type="sldImg"/>
@@ -1281,7 +1281,7 @@
       </p:sp>
       <p:sp>
         <p:nvSpPr>
-          <p:cNvPr id="178" name="Google Shape;178;p12:notes"/>
+          <p:cNvPr id="179" name="Google Shape;179;p12:notes"/>
           <p:cNvSpPr txBox="1"/>
           <p:nvPr>
             <p:ph idx="1" type="body"/>
@@ -1332,7 +1332,7 @@
       </p:sp>
       <p:sp>
         <p:nvSpPr>
-          <p:cNvPr id="179" name="Google Shape;179;p12:notes"/>
+          <p:cNvPr id="180" name="Google Shape;180;p12:notes"/>
           <p:cNvSpPr txBox="1"/>
           <p:nvPr>
             <p:ph idx="12" type="sldNum"/>
@@ -1403,7 +1403,7 @@
   <p:cSld>
     <p:spTree>
       <p:nvGrpSpPr>
-        <p:cNvPr id="195" name="Shape 195"/>
+        <p:cNvPr id="196" name="Shape 196"/>
         <p:cNvGrpSpPr/>
         <p:nvPr/>
       </p:nvGrpSpPr>
@@ -1417,7 +1417,7 @@
       </p:grpSpPr>
       <p:sp>
         <p:nvSpPr>
-          <p:cNvPr id="196" name="Google Shape;196;p13:notes"/>
+          <p:cNvPr id="197" name="Google Shape;197;p13:notes"/>
           <p:cNvSpPr/>
           <p:nvPr>
             <p:ph idx="2" type="sldImg"/>
@@ -1456,7 +1456,7 @@
       </p:sp>
       <p:sp>
         <p:nvSpPr>
-          <p:cNvPr id="197" name="Google Shape;197;p13:notes"/>
+          <p:cNvPr id="198" name="Google Shape;198;p13:notes"/>
           <p:cNvSpPr txBox="1"/>
           <p:nvPr>
             <p:ph idx="1" type="body"/>
@@ -1507,7 +1507,7 @@
       </p:sp>
       <p:sp>
         <p:nvSpPr>
-          <p:cNvPr id="198" name="Google Shape;198;p13:notes"/>
+          <p:cNvPr id="199" name="Google Shape;199;p13:notes"/>
           <p:cNvSpPr txBox="1"/>
           <p:nvPr>
             <p:ph idx="12" type="sldNum"/>
@@ -1578,7 +1578,7 @@
   <p:cSld>
     <p:spTree>
       <p:nvGrpSpPr>
-        <p:cNvPr id="203" name="Shape 203"/>
+        <p:cNvPr id="204" name="Shape 204"/>
         <p:cNvGrpSpPr/>
         <p:nvPr/>
       </p:nvGrpSpPr>
@@ -1592,7 +1592,7 @@
       </p:grpSpPr>
       <p:sp>
         <p:nvSpPr>
-          <p:cNvPr id="204" name="Google Shape;204;p14:notes"/>
+          <p:cNvPr id="205" name="Google Shape;205;p14:notes"/>
           <p:cNvSpPr/>
           <p:nvPr>
             <p:ph idx="2" type="sldImg"/>
@@ -1631,7 +1631,7 @@
       </p:sp>
       <p:sp>
         <p:nvSpPr>
-          <p:cNvPr id="205" name="Google Shape;205;p14:notes"/>
+          <p:cNvPr id="206" name="Google Shape;206;p14:notes"/>
           <p:cNvSpPr txBox="1"/>
           <p:nvPr>
             <p:ph idx="1" type="body"/>
@@ -1682,7 +1682,7 @@
       </p:sp>
       <p:sp>
         <p:nvSpPr>
-          <p:cNvPr id="206" name="Google Shape;206;p14:notes"/>
+          <p:cNvPr id="207" name="Google Shape;207;p14:notes"/>
           <p:cNvSpPr txBox="1"/>
           <p:nvPr>
             <p:ph idx="12" type="sldNum"/>
@@ -1753,7 +1753,7 @@
   <p:cSld>
     <p:spTree>
       <p:nvGrpSpPr>
-        <p:cNvPr id="225" name="Shape 225"/>
+        <p:cNvPr id="226" name="Shape 226"/>
         <p:cNvGrpSpPr/>
         <p:nvPr/>
       </p:nvGrpSpPr>
@@ -1767,7 +1767,7 @@
       </p:grpSpPr>
       <p:sp>
         <p:nvSpPr>
-          <p:cNvPr id="226" name="Google Shape;226;p15:notes"/>
+          <p:cNvPr id="227" name="Google Shape;227;p15:notes"/>
           <p:cNvSpPr/>
           <p:nvPr>
             <p:ph idx="2" type="sldImg"/>
@@ -1806,7 +1806,7 @@
       </p:sp>
       <p:sp>
         <p:nvSpPr>
-          <p:cNvPr id="227" name="Google Shape;227;p15:notes"/>
+          <p:cNvPr id="228" name="Google Shape;228;p15:notes"/>
           <p:cNvSpPr txBox="1"/>
           <p:nvPr>
             <p:ph idx="1" type="body"/>
@@ -1857,7 +1857,7 @@
       </p:sp>
       <p:sp>
         <p:nvSpPr>
-          <p:cNvPr id="228" name="Google Shape;228;p15:notes"/>
+          <p:cNvPr id="229" name="Google Shape;229;p15:notes"/>
           <p:cNvSpPr txBox="1"/>
           <p:nvPr>
             <p:ph idx="12" type="sldNum"/>
@@ -1928,7 +1928,7 @@
   <p:cSld>
     <p:spTree>
       <p:nvGrpSpPr>
-        <p:cNvPr id="247" name="Shape 247"/>
+        <p:cNvPr id="248" name="Shape 248"/>
         <p:cNvGrpSpPr/>
         <p:nvPr/>
       </p:nvGrpSpPr>
@@ -1942,7 +1942,7 @@
       </p:grpSpPr>
       <p:sp>
         <p:nvSpPr>
-          <p:cNvPr id="248" name="Google Shape;248;p16:notes"/>
+          <p:cNvPr id="249" name="Google Shape;249;p16:notes"/>
           <p:cNvSpPr/>
           <p:nvPr>
             <p:ph idx="2" type="sldImg"/>
@@ -1981,7 +1981,7 @@
       </p:sp>
       <p:sp>
         <p:nvSpPr>
-          <p:cNvPr id="249" name="Google Shape;249;p16:notes"/>
+          <p:cNvPr id="250" name="Google Shape;250;p16:notes"/>
           <p:cNvSpPr txBox="1"/>
           <p:nvPr>
             <p:ph idx="1" type="body"/>
@@ -2032,7 +2032,7 @@
       </p:sp>
       <p:sp>
         <p:nvSpPr>
-          <p:cNvPr id="250" name="Google Shape;250;p16:notes"/>
+          <p:cNvPr id="251" name="Google Shape;251;p16:notes"/>
           <p:cNvSpPr txBox="1"/>
           <p:nvPr>
             <p:ph idx="12" type="sldNum"/>
@@ -2103,7 +2103,7 @@
   <p:cSld>
     <p:spTree>
       <p:nvGrpSpPr>
-        <p:cNvPr id="265" name="Shape 265"/>
+        <p:cNvPr id="266" name="Shape 266"/>
         <p:cNvGrpSpPr/>
         <p:nvPr/>
       </p:nvGrpSpPr>
@@ -2117,7 +2117,7 @@
       </p:grpSpPr>
       <p:sp>
         <p:nvSpPr>
-          <p:cNvPr id="266" name="Google Shape;266;p17:notes"/>
+          <p:cNvPr id="267" name="Google Shape;267;p17:notes"/>
           <p:cNvSpPr/>
           <p:nvPr>
             <p:ph idx="2" type="sldImg"/>
@@ -2156,7 +2156,7 @@
       </p:sp>
       <p:sp>
         <p:nvSpPr>
-          <p:cNvPr id="267" name="Google Shape;267;p17:notes"/>
+          <p:cNvPr id="268" name="Google Shape;268;p17:notes"/>
           <p:cNvSpPr txBox="1"/>
           <p:nvPr>
             <p:ph idx="1" type="body"/>
@@ -2207,7 +2207,7 @@
       </p:sp>
       <p:sp>
         <p:nvSpPr>
-          <p:cNvPr id="268" name="Google Shape;268;p17:notes"/>
+          <p:cNvPr id="269" name="Google Shape;269;p17:notes"/>
           <p:cNvSpPr txBox="1"/>
           <p:nvPr>
             <p:ph idx="12" type="sldNum"/>
@@ -2278,7 +2278,7 @@
   <p:cSld>
     <p:spTree>
       <p:nvGrpSpPr>
-        <p:cNvPr id="15" name="Shape 15"/>
+        <p:cNvPr id="16" name="Shape 16"/>
         <p:cNvGrpSpPr/>
         <p:nvPr/>
       </p:nvGrpSpPr>
@@ -2292,7 +2292,7 @@
       </p:grpSpPr>
       <p:sp>
         <p:nvSpPr>
-          <p:cNvPr id="16" name="Google Shape;16;p2:notes"/>
+          <p:cNvPr id="17" name="Google Shape;17;p2:notes"/>
           <p:cNvSpPr/>
           <p:nvPr>
             <p:ph idx="2" type="sldImg"/>
@@ -2331,7 +2331,7 @@
       </p:sp>
       <p:sp>
         <p:nvSpPr>
-          <p:cNvPr id="17" name="Google Shape;17;p2:notes"/>
+          <p:cNvPr id="18" name="Google Shape;18;p2:notes"/>
           <p:cNvSpPr txBox="1"/>
           <p:nvPr>
             <p:ph idx="1" type="body"/>
@@ -2382,7 +2382,7 @@
       </p:sp>
       <p:sp>
         <p:nvSpPr>
-          <p:cNvPr id="18" name="Google Shape;18;p2:notes"/>
+          <p:cNvPr id="19" name="Google Shape;19;p2:notes"/>
           <p:cNvSpPr txBox="1"/>
           <p:nvPr>
             <p:ph idx="12" type="sldNum"/>
@@ -2453,7 +2453,7 @@
   <p:cSld>
     <p:spTree>
       <p:nvGrpSpPr>
-        <p:cNvPr id="23" name="Shape 23"/>
+        <p:cNvPr id="24" name="Shape 24"/>
         <p:cNvGrpSpPr/>
         <p:nvPr/>
       </p:nvGrpSpPr>
@@ -2467,7 +2467,7 @@
       </p:grpSpPr>
       <p:sp>
         <p:nvSpPr>
-          <p:cNvPr id="24" name="Google Shape;24;p3:notes"/>
+          <p:cNvPr id="25" name="Google Shape;25;p3:notes"/>
           <p:cNvSpPr/>
           <p:nvPr>
             <p:ph idx="2" type="sldImg"/>
@@ -2506,7 +2506,7 @@
       </p:sp>
       <p:sp>
         <p:nvSpPr>
-          <p:cNvPr id="25" name="Google Shape;25;p3:notes"/>
+          <p:cNvPr id="26" name="Google Shape;26;p3:notes"/>
           <p:cNvSpPr txBox="1"/>
           <p:nvPr>
             <p:ph idx="1" type="body"/>
@@ -2557,7 +2557,7 @@
       </p:sp>
       <p:sp>
         <p:nvSpPr>
-          <p:cNvPr id="26" name="Google Shape;26;p3:notes"/>
+          <p:cNvPr id="27" name="Google Shape;27;p3:notes"/>
           <p:cNvSpPr txBox="1"/>
           <p:nvPr>
             <p:ph idx="12" type="sldNum"/>
@@ -2628,7 +2628,7 @@
   <p:cSld>
     <p:spTree>
       <p:nvGrpSpPr>
-        <p:cNvPr id="44" name="Shape 44"/>
+        <p:cNvPr id="45" name="Shape 45"/>
         <p:cNvGrpSpPr/>
         <p:nvPr/>
       </p:nvGrpSpPr>
@@ -2642,7 +2642,7 @@
       </p:grpSpPr>
       <p:sp>
         <p:nvSpPr>
-          <p:cNvPr id="45" name="Google Shape;45;p4:notes"/>
+          <p:cNvPr id="46" name="Google Shape;46;p4:notes"/>
           <p:cNvSpPr/>
           <p:nvPr>
             <p:ph idx="2" type="sldImg"/>
@@ -2681,7 +2681,7 @@
       </p:sp>
       <p:sp>
         <p:nvSpPr>
-          <p:cNvPr id="46" name="Google Shape;46;p4:notes"/>
+          <p:cNvPr id="47" name="Google Shape;47;p4:notes"/>
           <p:cNvSpPr txBox="1"/>
           <p:nvPr>
             <p:ph idx="1" type="body"/>
@@ -2732,7 +2732,7 @@
       </p:sp>
       <p:sp>
         <p:nvSpPr>
-          <p:cNvPr id="47" name="Google Shape;47;p4:notes"/>
+          <p:cNvPr id="48" name="Google Shape;48;p4:notes"/>
           <p:cNvSpPr txBox="1"/>
           <p:nvPr>
             <p:ph idx="12" type="sldNum"/>
@@ -2803,7 +2803,7 @@
   <p:cSld>
     <p:spTree>
       <p:nvGrpSpPr>
-        <p:cNvPr id="63" name="Shape 63"/>
+        <p:cNvPr id="64" name="Shape 64"/>
         <p:cNvGrpSpPr/>
         <p:nvPr/>
       </p:nvGrpSpPr>
@@ -2817,7 +2817,7 @@
       </p:grpSpPr>
       <p:sp>
         <p:nvSpPr>
-          <p:cNvPr id="64" name="Google Shape;64;p5:notes"/>
+          <p:cNvPr id="65" name="Google Shape;65;p5:notes"/>
           <p:cNvSpPr/>
           <p:nvPr>
             <p:ph idx="2" type="sldImg"/>
@@ -2856,7 +2856,7 @@
       </p:sp>
       <p:sp>
         <p:nvSpPr>
-          <p:cNvPr id="65" name="Google Shape;65;p5:notes"/>
+          <p:cNvPr id="66" name="Google Shape;66;p5:notes"/>
           <p:cNvSpPr txBox="1"/>
           <p:nvPr>
             <p:ph idx="1" type="body"/>
@@ -2907,7 +2907,7 @@
       </p:sp>
       <p:sp>
         <p:nvSpPr>
-          <p:cNvPr id="66" name="Google Shape;66;p5:notes"/>
+          <p:cNvPr id="67" name="Google Shape;67;p5:notes"/>
           <p:cNvSpPr txBox="1"/>
           <p:nvPr>
             <p:ph idx="12" type="sldNum"/>
@@ -2978,7 +2978,7 @@
   <p:cSld>
     <p:spTree>
       <p:nvGrpSpPr>
-        <p:cNvPr id="71" name="Shape 71"/>
+        <p:cNvPr id="72" name="Shape 72"/>
         <p:cNvGrpSpPr/>
         <p:nvPr/>
       </p:nvGrpSpPr>
@@ -2992,7 +2992,7 @@
       </p:grpSpPr>
       <p:sp>
         <p:nvSpPr>
-          <p:cNvPr id="72" name="Google Shape;72;p6:notes"/>
+          <p:cNvPr id="73" name="Google Shape;73;p6:notes"/>
           <p:cNvSpPr/>
           <p:nvPr>
             <p:ph idx="2" type="sldImg"/>
@@ -3031,7 +3031,7 @@
       </p:sp>
       <p:sp>
         <p:nvSpPr>
-          <p:cNvPr id="73" name="Google Shape;73;p6:notes"/>
+          <p:cNvPr id="74" name="Google Shape;74;p6:notes"/>
           <p:cNvSpPr txBox="1"/>
           <p:nvPr>
             <p:ph idx="1" type="body"/>
@@ -3082,7 +3082,7 @@
       </p:sp>
       <p:sp>
         <p:nvSpPr>
-          <p:cNvPr id="74" name="Google Shape;74;p6:notes"/>
+          <p:cNvPr id="75" name="Google Shape;75;p6:notes"/>
           <p:cNvSpPr txBox="1"/>
           <p:nvPr>
             <p:ph idx="12" type="sldNum"/>
@@ -3153,7 +3153,7 @@
   <p:cSld>
     <p:spTree>
       <p:nvGrpSpPr>
-        <p:cNvPr id="89" name="Shape 89"/>
+        <p:cNvPr id="90" name="Shape 90"/>
         <p:cNvGrpSpPr/>
         <p:nvPr/>
       </p:nvGrpSpPr>
@@ -3167,7 +3167,7 @@
       </p:grpSpPr>
       <p:sp>
         <p:nvSpPr>
-          <p:cNvPr id="90" name="Google Shape;90;p7:notes"/>
+          <p:cNvPr id="91" name="Google Shape;91;p7:notes"/>
           <p:cNvSpPr/>
           <p:nvPr>
             <p:ph idx="2" type="sldImg"/>
@@ -3206,7 +3206,7 @@
       </p:sp>
       <p:sp>
         <p:nvSpPr>
-          <p:cNvPr id="91" name="Google Shape;91;p7:notes"/>
+          <p:cNvPr id="92" name="Google Shape;92;p7:notes"/>
           <p:cNvSpPr txBox="1"/>
           <p:nvPr>
             <p:ph idx="1" type="body"/>
@@ -3257,7 +3257,7 @@
       </p:sp>
       <p:sp>
         <p:nvSpPr>
-          <p:cNvPr id="92" name="Google Shape;92;p7:notes"/>
+          <p:cNvPr id="93" name="Google Shape;93;p7:notes"/>
           <p:cNvSpPr txBox="1"/>
           <p:nvPr>
             <p:ph idx="12" type="sldNum"/>
@@ -3328,7 +3328,7 @@
   <p:cSld>
     <p:spTree>
       <p:nvGrpSpPr>
-        <p:cNvPr id="110" name="Shape 110"/>
+        <p:cNvPr id="111" name="Shape 111"/>
         <p:cNvGrpSpPr/>
         <p:nvPr/>
       </p:nvGrpSpPr>
@@ -3342,7 +3342,7 @@
       </p:grpSpPr>
       <p:sp>
         <p:nvSpPr>
-          <p:cNvPr id="111" name="Google Shape;111;p8:notes"/>
+          <p:cNvPr id="112" name="Google Shape;112;p8:notes"/>
           <p:cNvSpPr/>
           <p:nvPr>
             <p:ph idx="2" type="sldImg"/>
@@ -3381,7 +3381,7 @@
       </p:sp>
       <p:sp>
         <p:nvSpPr>
-          <p:cNvPr id="112" name="Google Shape;112;p8:notes"/>
+          <p:cNvPr id="113" name="Google Shape;113;p8:notes"/>
           <p:cNvSpPr txBox="1"/>
           <p:nvPr>
             <p:ph idx="1" type="body"/>
@@ -3432,7 +3432,7 @@
       </p:sp>
       <p:sp>
         <p:nvSpPr>
-          <p:cNvPr id="113" name="Google Shape;113;p8:notes"/>
+          <p:cNvPr id="114" name="Google Shape;114;p8:notes"/>
           <p:cNvSpPr txBox="1"/>
           <p:nvPr>
             <p:ph idx="12" type="sldNum"/>
@@ -3503,7 +3503,7 @@
   <p:cSld>
     <p:spTree>
       <p:nvGrpSpPr>
-        <p:cNvPr id="129" name="Shape 129"/>
+        <p:cNvPr id="130" name="Shape 130"/>
         <p:cNvGrpSpPr/>
         <p:nvPr/>
       </p:nvGrpSpPr>
@@ -3517,7 +3517,7 @@
       </p:grpSpPr>
       <p:sp>
         <p:nvSpPr>
-          <p:cNvPr id="130" name="Google Shape;130;p9:notes"/>
+          <p:cNvPr id="131" name="Google Shape;131;p9:notes"/>
           <p:cNvSpPr/>
           <p:nvPr>
             <p:ph idx="2" type="sldImg"/>
@@ -3556,7 +3556,7 @@
       </p:sp>
       <p:sp>
         <p:nvSpPr>
-          <p:cNvPr id="131" name="Google Shape;131;p9:notes"/>
+          <p:cNvPr id="132" name="Google Shape;132;p9:notes"/>
           <p:cNvSpPr txBox="1"/>
           <p:nvPr>
             <p:ph idx="1" type="body"/>
@@ -3607,7 +3607,7 @@
       </p:sp>
       <p:sp>
         <p:nvSpPr>
-          <p:cNvPr id="132" name="Google Shape;132;p9:notes"/>
+          <p:cNvPr id="133" name="Google Shape;133;p9:notes"/>
           <p:cNvSpPr txBox="1"/>
           <p:nvPr>
             <p:ph idx="12" type="sldNum"/>
@@ -4520,8 +4520,8 @@
         </p:nvSpPr>
         <p:spPr>
           <a:xfrm>
-            <a:off x="1371600" y="2845418"/>
-            <a:ext cx="6400800" cy="1374222"/>
+            <a:off x="1371600" y="2323443"/>
+            <a:ext cx="6400800" cy="1374300"/>
           </a:xfrm>
           <a:prstGeom prst="rect">
             <a:avLst/>
@@ -4550,7 +4550,7 @@
               <a:buNone/>
             </a:pPr>
             <a:r>
-              <a:rPr b="1" i="0" lang="en-US" sz="4000" u="none" cap="none" strike="noStrike">
+              <a:rPr b="1" i="0" lang="en-US" sz="3600" u="none" cap="none" strike="noStrike">
                 <a:solidFill>
                   <a:srgbClr val="BD9052"/>
                 </a:solidFill>
@@ -4561,7 +4561,220 @@
               </a:rPr>
               <a:t>Game UI Design and Implementation Overview</a:t>
             </a:r>
-            <a:endParaRPr b="0" i="0" sz="4000" u="none" cap="none" strike="noStrike">
+            <a:endParaRPr b="0" i="0" sz="3600" u="none" cap="none" strike="noStrike">
+              <a:solidFill>
+                <a:schemeClr val="dk1"/>
+              </a:solidFill>
+              <a:latin typeface="Calibri"/>
+              <a:ea typeface="Calibri"/>
+              <a:cs typeface="Calibri"/>
+              <a:sym typeface="Calibri"/>
+            </a:endParaRPr>
+          </a:p>
+        </p:txBody>
+      </p:sp>
+      <p:sp>
+        <p:nvSpPr>
+          <p:cNvPr id="15" name="Google Shape;15;p1"/>
+          <p:cNvSpPr txBox="1"/>
+          <p:nvPr/>
+        </p:nvSpPr>
+        <p:spPr>
+          <a:xfrm>
+            <a:off x="130625" y="3697750"/>
+            <a:ext cx="4077600" cy="1324500"/>
+          </a:xfrm>
+          <a:prstGeom prst="rect">
+            <a:avLst/>
+          </a:prstGeom>
+          <a:noFill/>
+          <a:ln>
+            <a:noFill/>
+          </a:ln>
+        </p:spPr>
+        <p:txBody>
+          <a:bodyPr anchorCtr="0" anchor="t" bIns="91425" lIns="91425" spcFirstLastPara="1" rIns="91425" wrap="square" tIns="91425">
+            <a:spAutoFit/>
+          </a:bodyPr>
+          <a:lstStyle/>
+          <a:p>
+            <a:pPr indent="0" lvl="0" marL="0" marR="152400" rtl="0" algn="l">
+              <a:lnSpc>
+                <a:spcPct val="102916"/>
+              </a:lnSpc>
+              <a:spcBef>
+                <a:spcPts val="5"/>
+              </a:spcBef>
+              <a:spcAft>
+                <a:spcPts val="0"/>
+              </a:spcAft>
+              <a:buNone/>
+            </a:pPr>
+            <a:r>
+              <a:rPr b="1" lang="en-US" sz="1200">
+                <a:solidFill>
+                  <a:schemeClr val="dk1"/>
+                </a:solidFill>
+                <a:latin typeface="Calibri"/>
+                <a:ea typeface="Calibri"/>
+                <a:cs typeface="Calibri"/>
+                <a:sym typeface="Calibri"/>
+              </a:rPr>
+              <a:t>XU Yuan                   </a:t>
+            </a:r>
+            <a:r>
+              <a:rPr lang="en-US" sz="1200">
+                <a:latin typeface="Calibri"/>
+                <a:ea typeface="Calibri"/>
+                <a:cs typeface="Calibri"/>
+                <a:sym typeface="Calibri"/>
+              </a:rPr>
+              <a:t>24036523d</a:t>
+            </a:r>
+            <a:endParaRPr sz="1200">
+              <a:latin typeface="Calibri"/>
+              <a:ea typeface="Calibri"/>
+              <a:cs typeface="Calibri"/>
+              <a:sym typeface="Calibri"/>
+            </a:endParaRPr>
+          </a:p>
+          <a:p>
+            <a:pPr indent="0" lvl="0" marL="0" marR="152400" rtl="0" algn="l">
+              <a:lnSpc>
+                <a:spcPct val="102916"/>
+              </a:lnSpc>
+              <a:spcBef>
+                <a:spcPts val="1000"/>
+              </a:spcBef>
+              <a:spcAft>
+                <a:spcPts val="0"/>
+              </a:spcAft>
+              <a:buNone/>
+            </a:pPr>
+            <a:r>
+              <a:rPr b="1" lang="en-US" sz="1200">
+                <a:solidFill>
+                  <a:schemeClr val="dk1"/>
+                </a:solidFill>
+                <a:latin typeface="Calibri"/>
+                <a:ea typeface="Calibri"/>
+                <a:cs typeface="Calibri"/>
+                <a:sym typeface="Calibri"/>
+              </a:rPr>
+              <a:t>KWAN Chun Yin     </a:t>
+            </a:r>
+            <a:r>
+              <a:rPr lang="en-US" sz="1200">
+                <a:solidFill>
+                  <a:schemeClr val="dk1"/>
+                </a:solidFill>
+                <a:latin typeface="Calibri"/>
+                <a:ea typeface="Calibri"/>
+                <a:cs typeface="Calibri"/>
+                <a:sym typeface="Calibri"/>
+              </a:rPr>
+              <a:t>24123102d</a:t>
+            </a:r>
+            <a:endParaRPr sz="1200">
+              <a:solidFill>
+                <a:schemeClr val="dk1"/>
+              </a:solidFill>
+              <a:latin typeface="Calibri"/>
+              <a:ea typeface="Calibri"/>
+              <a:cs typeface="Calibri"/>
+              <a:sym typeface="Calibri"/>
+            </a:endParaRPr>
+          </a:p>
+          <a:p>
+            <a:pPr indent="0" lvl="0" marL="0" marR="152400" rtl="0" algn="l">
+              <a:lnSpc>
+                <a:spcPct val="102916"/>
+              </a:lnSpc>
+              <a:spcBef>
+                <a:spcPts val="1000"/>
+              </a:spcBef>
+              <a:spcAft>
+                <a:spcPts val="0"/>
+              </a:spcAft>
+              <a:buNone/>
+            </a:pPr>
+            <a:r>
+              <a:rPr b="1" lang="en-US" sz="1200">
+                <a:solidFill>
+                  <a:schemeClr val="dk1"/>
+                </a:solidFill>
+                <a:latin typeface="Calibri"/>
+                <a:ea typeface="Calibri"/>
+                <a:cs typeface="Calibri"/>
+                <a:sym typeface="Calibri"/>
+              </a:rPr>
+              <a:t>TSANG Man Ho      </a:t>
+            </a:r>
+            <a:r>
+              <a:rPr lang="en-US" sz="1200">
+                <a:solidFill>
+                  <a:schemeClr val="dk1"/>
+                </a:solidFill>
+                <a:latin typeface="Calibri"/>
+                <a:ea typeface="Calibri"/>
+                <a:cs typeface="Calibri"/>
+                <a:sym typeface="Calibri"/>
+              </a:rPr>
+              <a:t>24028571d</a:t>
+            </a:r>
+            <a:endParaRPr sz="1200">
+              <a:solidFill>
+                <a:schemeClr val="dk1"/>
+              </a:solidFill>
+              <a:latin typeface="Calibri"/>
+              <a:ea typeface="Calibri"/>
+              <a:cs typeface="Calibri"/>
+              <a:sym typeface="Calibri"/>
+            </a:endParaRPr>
+          </a:p>
+          <a:p>
+            <a:pPr indent="0" lvl="0" marL="0" marR="152400" rtl="0" algn="l">
+              <a:lnSpc>
+                <a:spcPct val="102916"/>
+              </a:lnSpc>
+              <a:spcBef>
+                <a:spcPts val="1000"/>
+              </a:spcBef>
+              <a:spcAft>
+                <a:spcPts val="1000"/>
+              </a:spcAft>
+              <a:buClr>
+                <a:schemeClr val="dk1"/>
+              </a:buClr>
+              <a:buSzPts val="1100"/>
+              <a:buFont typeface="Arial"/>
+              <a:buNone/>
+            </a:pPr>
+            <a:r>
+              <a:rPr b="1" lang="en-US" sz="1200">
+                <a:solidFill>
+                  <a:schemeClr val="dk1"/>
+                </a:solidFill>
+                <a:latin typeface="Calibri"/>
+                <a:ea typeface="Calibri"/>
+                <a:cs typeface="Calibri"/>
+                <a:sym typeface="Calibri"/>
+              </a:rPr>
+              <a:t>TSE Hung Lap         </a:t>
+            </a:r>
+            <a:r>
+              <a:rPr lang="en-US" sz="1200">
+                <a:solidFill>
+                  <a:schemeClr val="dk1"/>
+                </a:solidFill>
+                <a:latin typeface="Calibri"/>
+                <a:ea typeface="Calibri"/>
+                <a:cs typeface="Calibri"/>
+                <a:sym typeface="Calibri"/>
+              </a:rPr>
+              <a:t>24028633d</a:t>
+            </a:r>
+            <a:endParaRPr sz="1200">
               <a:solidFill>
                 <a:schemeClr val="dk1"/>
               </a:solidFill>
@@ -4593,7 +4806,7 @@
     </p:bg>
     <p:spTree>
       <p:nvGrpSpPr>
-        <p:cNvPr id="141" name="Shape 141"/>
+        <p:cNvPr id="142" name="Shape 142"/>
         <p:cNvGrpSpPr/>
         <p:nvPr/>
       </p:nvGrpSpPr>
@@ -4607,7 +4820,7 @@
       </p:grpSpPr>
       <p:sp>
         <p:nvSpPr>
-          <p:cNvPr id="142" name="Google Shape;142;p10"/>
+          <p:cNvPr id="143" name="Google Shape;143;p10"/>
           <p:cNvSpPr/>
           <p:nvPr/>
         </p:nvSpPr>
@@ -4668,13 +4881,13 @@
       </p:sp>
       <p:sp>
         <p:nvSpPr>
-          <p:cNvPr id="143" name="Google Shape;143;p10"/>
+          <p:cNvPr id="144" name="Google Shape;144;p10"/>
           <p:cNvSpPr/>
           <p:nvPr/>
         </p:nvSpPr>
         <p:spPr>
           <a:xfrm>
-            <a:off x="697686" y="2302488"/>
+            <a:off x="732661" y="1151451"/>
             <a:ext cx="5852160" cy="1208853"/>
           </a:xfrm>
           <a:custGeom>
@@ -4763,14 +4976,14 @@
       </p:sp>
       <p:sp>
         <p:nvSpPr>
-          <p:cNvPr id="144" name="Google Shape;144;p10"/>
+          <p:cNvPr id="145" name="Google Shape;145;p10"/>
           <p:cNvSpPr/>
           <p:nvPr/>
         </p:nvSpPr>
         <p:spPr>
           <a:xfrm>
-            <a:off x="715004" y="2320776"/>
-            <a:ext cx="5834842" cy="369332"/>
+            <a:off x="749979" y="1169739"/>
+            <a:ext cx="5834700" cy="369300"/>
           </a:xfrm>
           <a:prstGeom prst="rect">
             <a:avLst/>
@@ -4824,14 +5037,14 @@
       </p:sp>
       <p:sp>
         <p:nvSpPr>
-          <p:cNvPr id="145" name="Google Shape;145;p10"/>
+          <p:cNvPr id="146" name="Google Shape;146;p10"/>
           <p:cNvSpPr/>
           <p:nvPr/>
         </p:nvSpPr>
         <p:spPr>
           <a:xfrm>
-            <a:off x="715004" y="2596940"/>
-            <a:ext cx="5834842" cy="365760"/>
+            <a:off x="749979" y="1445902"/>
+            <a:ext cx="5834700" cy="365700"/>
           </a:xfrm>
           <a:prstGeom prst="rect">
             <a:avLst/>
@@ -4885,13 +5098,13 @@
       </p:sp>
       <p:sp>
         <p:nvSpPr>
-          <p:cNvPr id="146" name="Google Shape;146;p10"/>
+          <p:cNvPr id="147" name="Google Shape;147;p10"/>
           <p:cNvSpPr/>
           <p:nvPr/>
         </p:nvSpPr>
         <p:spPr>
           <a:xfrm>
-            <a:off x="697686" y="942296"/>
+            <a:off x="-8259964" y="718796"/>
             <a:ext cx="5852160" cy="1208853"/>
           </a:xfrm>
           <a:custGeom>
@@ -4980,14 +5193,14 @@
       </p:sp>
       <p:sp>
         <p:nvSpPr>
-          <p:cNvPr id="147" name="Google Shape;147;p10"/>
+          <p:cNvPr id="148" name="Google Shape;148;p10"/>
           <p:cNvSpPr/>
           <p:nvPr/>
         </p:nvSpPr>
         <p:spPr>
           <a:xfrm>
-            <a:off x="715004" y="960584"/>
-            <a:ext cx="5834842" cy="369332"/>
+            <a:off x="-8242646" y="737084"/>
+            <a:ext cx="5834700" cy="369300"/>
           </a:xfrm>
           <a:prstGeom prst="rect">
             <a:avLst/>
@@ -5041,14 +5254,14 @@
       </p:sp>
       <p:sp>
         <p:nvSpPr>
-          <p:cNvPr id="148" name="Google Shape;148;p10"/>
+          <p:cNvPr id="149" name="Google Shape;149;p10"/>
           <p:cNvSpPr/>
           <p:nvPr/>
         </p:nvSpPr>
         <p:spPr>
           <a:xfrm>
-            <a:off x="715004" y="1236748"/>
-            <a:ext cx="5834842" cy="365760"/>
+            <a:off x="-8242646" y="1013248"/>
+            <a:ext cx="5834700" cy="365700"/>
           </a:xfrm>
           <a:prstGeom prst="rect">
             <a:avLst/>
@@ -5102,13 +5315,13 @@
       </p:sp>
       <p:sp>
         <p:nvSpPr>
-          <p:cNvPr id="149" name="Google Shape;149;p10"/>
+          <p:cNvPr id="150" name="Google Shape;150;p10"/>
           <p:cNvSpPr/>
           <p:nvPr/>
         </p:nvSpPr>
         <p:spPr>
           <a:xfrm>
-            <a:off x="697686" y="3662679"/>
+            <a:off x="806836" y="2831154"/>
             <a:ext cx="5852160" cy="1208853"/>
           </a:xfrm>
           <a:custGeom>
@@ -5197,14 +5410,14 @@
       </p:sp>
       <p:sp>
         <p:nvSpPr>
-          <p:cNvPr id="150" name="Google Shape;150;p10"/>
+          <p:cNvPr id="151" name="Google Shape;151;p10"/>
           <p:cNvSpPr/>
           <p:nvPr/>
         </p:nvSpPr>
         <p:spPr>
           <a:xfrm>
-            <a:off x="715004" y="3680967"/>
-            <a:ext cx="5834842" cy="369332"/>
+            <a:off x="824154" y="2849442"/>
+            <a:ext cx="5834700" cy="369300"/>
           </a:xfrm>
           <a:prstGeom prst="rect">
             <a:avLst/>
@@ -5266,14 +5479,14 @@
       </p:sp>
       <p:sp>
         <p:nvSpPr>
-          <p:cNvPr id="151" name="Google Shape;151;p10"/>
+          <p:cNvPr id="152" name="Google Shape;152;p10"/>
           <p:cNvSpPr/>
           <p:nvPr/>
         </p:nvSpPr>
         <p:spPr>
           <a:xfrm>
-            <a:off x="715004" y="3957132"/>
-            <a:ext cx="5834842" cy="365760"/>
+            <a:off x="824154" y="3125607"/>
+            <a:ext cx="5834700" cy="365700"/>
           </a:xfrm>
           <a:prstGeom prst="rect">
             <a:avLst/>
@@ -5335,7 +5548,7 @@
       </p:sp>
       <p:pic>
         <p:nvPicPr>
-          <p:cNvPr descr="/uploadFile/125_1.jpg" id="152" name="Google Shape;152;p10"/>
+          <p:cNvPr descr="/uploadFile/125_1.jpg" id="153" name="Google Shape;153;p10"/>
           <p:cNvPicPr preferRelativeResize="0"/>
           <p:nvPr/>
         </p:nvPicPr>
@@ -5348,8 +5561,8 @@
         </p:blipFill>
         <p:spPr>
           <a:xfrm>
-            <a:off x="7052481" y="2540397"/>
-            <a:ext cx="1323804" cy="733033"/>
+            <a:off x="7087456" y="1389360"/>
+            <a:ext cx="1323900" cy="732900"/>
           </a:xfrm>
           <a:prstGeom prst="chevron">
             <a:avLst>
@@ -5364,7 +5577,7 @@
       </p:pic>
       <p:pic>
         <p:nvPicPr>
-          <p:cNvPr descr="/uploadFile/125_5.png" id="153" name="Google Shape;153;p10"/>
+          <p:cNvPr descr="/uploadFile/125_5.png" id="154" name="Google Shape;154;p10"/>
           <p:cNvPicPr preferRelativeResize="0"/>
           <p:nvPr/>
         </p:nvPicPr>
@@ -5377,8 +5590,8 @@
         </p:blipFill>
         <p:spPr>
           <a:xfrm>
-            <a:off x="6844135" y="1079036"/>
-            <a:ext cx="1740495" cy="935372"/>
+            <a:off x="-2113515" y="855536"/>
+            <a:ext cx="1740600" cy="935400"/>
           </a:xfrm>
           <a:prstGeom prst="chevron">
             <a:avLst>
@@ -5393,7 +5606,7 @@
       </p:pic>
       <p:pic>
         <p:nvPicPr>
-          <p:cNvPr descr="/uploadFile/125_5.png" id="154" name="Google Shape;154;p10"/>
+          <p:cNvPr descr="/uploadFile/125_5.png" id="155" name="Google Shape;155;p10"/>
           <p:cNvPicPr preferRelativeResize="0"/>
           <p:nvPr/>
         </p:nvPicPr>
@@ -5406,8 +5619,8 @@
         </p:blipFill>
         <p:spPr>
           <a:xfrm>
-            <a:off x="7200815" y="3813513"/>
-            <a:ext cx="1027136" cy="652998"/>
+            <a:off x="7309965" y="2981988"/>
+            <a:ext cx="1027200" cy="653100"/>
           </a:xfrm>
           <a:prstGeom prst="chevron">
             <a:avLst>
@@ -5429,7 +5642,7 @@
 </file>
 
 <file path=ppt/slides/slide11.xml><?xml version="1.0" encoding="utf-8"?>
-<p:sld xmlns:a="http://schemas.openxmlformats.org/drawingml/2006/main" xmlns:r="http://schemas.openxmlformats.org/officeDocument/2006/relationships" xmlns:mc="http://schemas.openxmlformats.org/markup-compatibility/2006" xmlns:mv="urn:schemas-microsoft-com:mac:vml" xmlns:p="http://schemas.openxmlformats.org/presentationml/2006/main" xmlns:c="http://schemas.openxmlformats.org/drawingml/2006/chart" xmlns:dgm="http://schemas.openxmlformats.org/drawingml/2006/diagram" xmlns:o="urn:schemas-microsoft-com:office:office" xmlns:v="urn:schemas-microsoft-com:vml" xmlns:pvml="urn:schemas-microsoft-com:office:powerpoint" xmlns:com="http://schemas.openxmlformats.org/drawingml/2006/compatibility" xmlns:p14="http://schemas.microsoft.com/office/powerpoint/2010/main" xmlns:p15="http://schemas.microsoft.com/office/powerpoint/2012/main" xmlns:ahyp="http://schemas.microsoft.com/office/drawing/2018/hyperlinkcolor">
+<p:sld xmlns:a="http://schemas.openxmlformats.org/drawingml/2006/main" xmlns:r="http://schemas.openxmlformats.org/officeDocument/2006/relationships" xmlns:mc="http://schemas.openxmlformats.org/markup-compatibility/2006" xmlns:mv="urn:schemas-microsoft-com:mac:vml" xmlns:p="http://schemas.openxmlformats.org/presentationml/2006/main" xmlns:c="http://schemas.openxmlformats.org/drawingml/2006/chart" xmlns:dgm="http://schemas.openxmlformats.org/drawingml/2006/diagram" xmlns:o="urn:schemas-microsoft-com:office:office" xmlns:v="urn:schemas-microsoft-com:vml" xmlns:pvml="urn:schemas-microsoft-com:office:powerpoint" xmlns:com="http://schemas.openxmlformats.org/drawingml/2006/compatibility" xmlns:p14="http://schemas.microsoft.com/office/powerpoint/2010/main" xmlns:p15="http://schemas.microsoft.com/office/powerpoint/2012/main" xmlns:ahyp="http://schemas.microsoft.com/office/drawing/2018/hyperlinkcolor" show="0">
   <p:cSld>
     <p:bg>
       <p:bgPr>
@@ -5440,7 +5653,7 @@
     </p:bg>
     <p:spTree>
       <p:nvGrpSpPr>
-        <p:cNvPr id="159" name="Shape 159"/>
+        <p:cNvPr id="160" name="Shape 160"/>
         <p:cNvGrpSpPr/>
         <p:nvPr/>
       </p:nvGrpSpPr>
@@ -5454,7 +5667,7 @@
       </p:grpSpPr>
       <p:sp>
         <p:nvSpPr>
-          <p:cNvPr id="160" name="Google Shape;160;p11"/>
+          <p:cNvPr id="161" name="Google Shape;161;p11"/>
           <p:cNvSpPr/>
           <p:nvPr/>
         </p:nvSpPr>
@@ -5515,7 +5728,7 @@
       </p:sp>
       <p:sp>
         <p:nvSpPr>
-          <p:cNvPr id="161" name="Google Shape;161;p11"/>
+          <p:cNvPr id="162" name="Google Shape;162;p11"/>
           <p:cNvSpPr/>
           <p:nvPr/>
         </p:nvSpPr>
@@ -5610,7 +5823,7 @@
       </p:sp>
       <p:sp>
         <p:nvSpPr>
-          <p:cNvPr id="162" name="Google Shape;162;p11"/>
+          <p:cNvPr id="163" name="Google Shape;163;p11"/>
           <p:cNvSpPr/>
           <p:nvPr/>
         </p:nvSpPr>
@@ -5671,7 +5884,7 @@
       </p:sp>
       <p:sp>
         <p:nvSpPr>
-          <p:cNvPr id="163" name="Google Shape;163;p11"/>
+          <p:cNvPr id="164" name="Google Shape;164;p11"/>
           <p:cNvSpPr/>
           <p:nvPr/>
         </p:nvSpPr>
@@ -5732,7 +5945,7 @@
       </p:sp>
       <p:sp>
         <p:nvSpPr>
-          <p:cNvPr id="164" name="Google Shape;164;p11"/>
+          <p:cNvPr id="165" name="Google Shape;165;p11"/>
           <p:cNvSpPr/>
           <p:nvPr/>
         </p:nvSpPr>
@@ -5821,7 +6034,7 @@
       </p:sp>
       <p:sp>
         <p:nvSpPr>
-          <p:cNvPr id="165" name="Google Shape;165;p11"/>
+          <p:cNvPr id="166" name="Google Shape;166;p11"/>
           <p:cNvSpPr/>
           <p:nvPr/>
         </p:nvSpPr>
@@ -5882,7 +6095,7 @@
       </p:sp>
       <p:sp>
         <p:nvSpPr>
-          <p:cNvPr id="166" name="Google Shape;166;p11"/>
+          <p:cNvPr id="167" name="Google Shape;167;p11"/>
           <p:cNvSpPr/>
           <p:nvPr/>
         </p:nvSpPr>
@@ -5943,7 +6156,7 @@
       </p:sp>
       <p:sp>
         <p:nvSpPr>
-          <p:cNvPr id="167" name="Google Shape;167;p11"/>
+          <p:cNvPr id="168" name="Google Shape;168;p11"/>
           <p:cNvSpPr/>
           <p:nvPr/>
         </p:nvSpPr>
@@ -6038,7 +6251,7 @@
       </p:sp>
       <p:sp>
         <p:nvSpPr>
-          <p:cNvPr id="168" name="Google Shape;168;p11"/>
+          <p:cNvPr id="169" name="Google Shape;169;p11"/>
           <p:cNvSpPr/>
           <p:nvPr/>
         </p:nvSpPr>
@@ -6099,7 +6312,7 @@
       </p:sp>
       <p:sp>
         <p:nvSpPr>
-          <p:cNvPr id="169" name="Google Shape;169;p11"/>
+          <p:cNvPr id="170" name="Google Shape;170;p11"/>
           <p:cNvSpPr/>
           <p:nvPr/>
         </p:nvSpPr>
@@ -6160,7 +6373,7 @@
       </p:sp>
       <p:sp>
         <p:nvSpPr>
-          <p:cNvPr id="170" name="Google Shape;170;p11"/>
+          <p:cNvPr id="171" name="Google Shape;171;p11"/>
           <p:cNvSpPr/>
           <p:nvPr/>
         </p:nvSpPr>
@@ -6239,7 +6452,7 @@
       </p:sp>
       <p:sp>
         <p:nvSpPr>
-          <p:cNvPr id="171" name="Google Shape;171;p11"/>
+          <p:cNvPr id="172" name="Google Shape;172;p11"/>
           <p:cNvSpPr/>
           <p:nvPr/>
         </p:nvSpPr>
@@ -6318,7 +6531,7 @@
       </p:sp>
       <p:sp>
         <p:nvSpPr>
-          <p:cNvPr id="172" name="Google Shape;172;p11"/>
+          <p:cNvPr id="173" name="Google Shape;173;p11"/>
           <p:cNvSpPr/>
           <p:nvPr/>
         </p:nvSpPr>
@@ -6397,7 +6610,7 @@
       </p:sp>
       <p:sp>
         <p:nvSpPr>
-          <p:cNvPr id="173" name="Google Shape;173;p11"/>
+          <p:cNvPr id="174" name="Google Shape;174;p11"/>
           <p:cNvSpPr/>
           <p:nvPr/>
         </p:nvSpPr>
@@ -6458,7 +6671,7 @@
       </p:sp>
       <p:sp>
         <p:nvSpPr>
-          <p:cNvPr id="174" name="Google Shape;174;p11"/>
+          <p:cNvPr id="175" name="Google Shape;175;p11"/>
           <p:cNvSpPr/>
           <p:nvPr/>
         </p:nvSpPr>
@@ -6519,7 +6732,7 @@
       </p:sp>
       <p:sp>
         <p:nvSpPr>
-          <p:cNvPr id="175" name="Google Shape;175;p11"/>
+          <p:cNvPr id="176" name="Google Shape;176;p11"/>
           <p:cNvSpPr/>
           <p:nvPr/>
         </p:nvSpPr>
@@ -6587,7 +6800,7 @@
 </file>
 
 <file path=ppt/slides/slide12.xml><?xml version="1.0" encoding="utf-8"?>
-<p:sld xmlns:a="http://schemas.openxmlformats.org/drawingml/2006/main" xmlns:r="http://schemas.openxmlformats.org/officeDocument/2006/relationships" xmlns:mc="http://schemas.openxmlformats.org/markup-compatibility/2006" xmlns:mv="urn:schemas-microsoft-com:mac:vml" xmlns:p="http://schemas.openxmlformats.org/presentationml/2006/main" xmlns:c="http://schemas.openxmlformats.org/drawingml/2006/chart" xmlns:dgm="http://schemas.openxmlformats.org/drawingml/2006/diagram" xmlns:o="urn:schemas-microsoft-com:office:office" xmlns:v="urn:schemas-microsoft-com:vml" xmlns:pvml="urn:schemas-microsoft-com:office:powerpoint" xmlns:com="http://schemas.openxmlformats.org/drawingml/2006/compatibility" xmlns:p14="http://schemas.microsoft.com/office/powerpoint/2010/main" xmlns:p15="http://schemas.microsoft.com/office/powerpoint/2012/main" xmlns:ahyp="http://schemas.microsoft.com/office/drawing/2018/hyperlinkcolor">
+<p:sld xmlns:a="http://schemas.openxmlformats.org/drawingml/2006/main" xmlns:r="http://schemas.openxmlformats.org/officeDocument/2006/relationships" xmlns:mc="http://schemas.openxmlformats.org/markup-compatibility/2006" xmlns:mv="urn:schemas-microsoft-com:mac:vml" xmlns:p="http://schemas.openxmlformats.org/presentationml/2006/main" xmlns:c="http://schemas.openxmlformats.org/drawingml/2006/chart" xmlns:dgm="http://schemas.openxmlformats.org/drawingml/2006/diagram" xmlns:o="urn:schemas-microsoft-com:office:office" xmlns:v="urn:schemas-microsoft-com:vml" xmlns:pvml="urn:schemas-microsoft-com:office:powerpoint" xmlns:com="http://schemas.openxmlformats.org/drawingml/2006/compatibility" xmlns:p14="http://schemas.microsoft.com/office/powerpoint/2010/main" xmlns:p15="http://schemas.microsoft.com/office/powerpoint/2012/main" xmlns:ahyp="http://schemas.microsoft.com/office/drawing/2018/hyperlinkcolor" show="0">
   <p:cSld>
     <p:bg>
       <p:bgPr>
@@ -6598,7 +6811,7 @@
     </p:bg>
     <p:spTree>
       <p:nvGrpSpPr>
-        <p:cNvPr id="180" name="Shape 180"/>
+        <p:cNvPr id="181" name="Shape 181"/>
         <p:cNvGrpSpPr/>
         <p:nvPr/>
       </p:nvGrpSpPr>
@@ -6612,7 +6825,7 @@
       </p:grpSpPr>
       <p:sp>
         <p:nvSpPr>
-          <p:cNvPr id="181" name="Google Shape;181;p12"/>
+          <p:cNvPr id="182" name="Google Shape;182;p12"/>
           <p:cNvSpPr/>
           <p:nvPr/>
         </p:nvSpPr>
@@ -6673,7 +6886,7 @@
       </p:sp>
       <p:sp>
         <p:nvSpPr>
-          <p:cNvPr id="182" name="Google Shape;182;p12"/>
+          <p:cNvPr id="183" name="Google Shape;183;p12"/>
           <p:cNvSpPr/>
           <p:nvPr/>
         </p:nvSpPr>
@@ -6752,7 +6965,7 @@
       </p:sp>
       <p:sp>
         <p:nvSpPr>
-          <p:cNvPr id="183" name="Google Shape;183;p12"/>
+          <p:cNvPr id="184" name="Google Shape;184;p12"/>
           <p:cNvSpPr/>
           <p:nvPr/>
         </p:nvSpPr>
@@ -6831,7 +7044,7 @@
       </p:sp>
       <p:sp>
         <p:nvSpPr>
-          <p:cNvPr id="184" name="Google Shape;184;p12"/>
+          <p:cNvPr id="185" name="Google Shape;185;p12"/>
           <p:cNvSpPr/>
           <p:nvPr/>
         </p:nvSpPr>
@@ -6892,7 +7105,7 @@
       </p:sp>
       <p:sp>
         <p:nvSpPr>
-          <p:cNvPr id="185" name="Google Shape;185;p12"/>
+          <p:cNvPr id="186" name="Google Shape;186;p12"/>
           <p:cNvSpPr/>
           <p:nvPr/>
         </p:nvSpPr>
@@ -6953,7 +7166,7 @@
       </p:sp>
       <p:sp>
         <p:nvSpPr>
-          <p:cNvPr id="186" name="Google Shape;186;p12"/>
+          <p:cNvPr id="187" name="Google Shape;187;p12"/>
           <p:cNvSpPr/>
           <p:nvPr/>
         </p:nvSpPr>
@@ -7040,7 +7253,7 @@
       </p:sp>
       <p:sp>
         <p:nvSpPr>
-          <p:cNvPr id="187" name="Google Shape;187;p12"/>
+          <p:cNvPr id="188" name="Google Shape;188;p12"/>
           <p:cNvSpPr/>
           <p:nvPr/>
         </p:nvSpPr>
@@ -7101,7 +7314,7 @@
       </p:sp>
       <p:sp>
         <p:nvSpPr>
-          <p:cNvPr id="188" name="Google Shape;188;p12"/>
+          <p:cNvPr id="189" name="Google Shape;189;p12"/>
           <p:cNvSpPr/>
           <p:nvPr/>
         </p:nvSpPr>
@@ -7162,7 +7375,7 @@
       </p:sp>
       <p:sp>
         <p:nvSpPr>
-          <p:cNvPr id="189" name="Google Shape;189;p12"/>
+          <p:cNvPr id="190" name="Google Shape;190;p12"/>
           <p:cNvSpPr/>
           <p:nvPr/>
         </p:nvSpPr>
@@ -7223,7 +7436,7 @@
       </p:sp>
       <p:sp>
         <p:nvSpPr>
-          <p:cNvPr id="190" name="Google Shape;190;p12"/>
+          <p:cNvPr id="191" name="Google Shape;191;p12"/>
           <p:cNvSpPr/>
           <p:nvPr/>
         </p:nvSpPr>
@@ -7284,7 +7497,7 @@
       </p:sp>
       <p:sp>
         <p:nvSpPr>
-          <p:cNvPr id="191" name="Google Shape;191;p12"/>
+          <p:cNvPr id="192" name="Google Shape;192;p12"/>
           <p:cNvSpPr/>
           <p:nvPr/>
         </p:nvSpPr>
@@ -7349,7 +7562,7 @@
       </p:sp>
       <p:pic>
         <p:nvPicPr>
-          <p:cNvPr descr="/uploadFile/125_2.jpg" id="192" name="Google Shape;192;p12"/>
+          <p:cNvPr descr="/uploadFile/125_2.jpg" id="193" name="Google Shape;193;p12"/>
           <p:cNvPicPr preferRelativeResize="0"/>
           <p:nvPr/>
         </p:nvPicPr>
@@ -7378,7 +7591,7 @@
       </p:pic>
       <p:pic>
         <p:nvPicPr>
-          <p:cNvPr descr="/uploadFile/125_2.jpg" id="193" name="Google Shape;193;p12"/>
+          <p:cNvPr descr="/uploadFile/125_2.jpg" id="194" name="Google Shape;194;p12"/>
           <p:cNvPicPr preferRelativeResize="0"/>
           <p:nvPr/>
         </p:nvPicPr>
@@ -7407,7 +7620,7 @@
       </p:pic>
       <p:pic>
         <p:nvPicPr>
-          <p:cNvPr descr="/uploadFile/125_2.jpg" id="194" name="Google Shape;194;p12"/>
+          <p:cNvPr descr="/uploadFile/125_2.jpg" id="195" name="Google Shape;195;p12"/>
           <p:cNvPicPr preferRelativeResize="0"/>
           <p:nvPr/>
         </p:nvPicPr>
@@ -7454,7 +7667,7 @@
     </p:bg>
     <p:spTree>
       <p:nvGrpSpPr>
-        <p:cNvPr id="199" name="Shape 199"/>
+        <p:cNvPr id="200" name="Shape 200"/>
         <p:cNvGrpSpPr/>
         <p:nvPr/>
       </p:nvGrpSpPr>
@@ -7468,7 +7681,7 @@
       </p:grpSpPr>
       <p:sp>
         <p:nvSpPr>
-          <p:cNvPr id="200" name="Google Shape;200;p13"/>
+          <p:cNvPr id="201" name="Google Shape;201;p13"/>
           <p:cNvSpPr/>
           <p:nvPr/>
         </p:nvSpPr>
@@ -7536,7 +7749,7 @@
       </p:sp>
       <p:sp>
         <p:nvSpPr>
-          <p:cNvPr id="201" name="Google Shape;201;p13"/>
+          <p:cNvPr id="202" name="Google Shape;202;p13"/>
           <p:cNvSpPr/>
           <p:nvPr/>
         </p:nvSpPr>
@@ -7597,7 +7810,7 @@
       </p:sp>
       <p:pic>
         <p:nvPicPr>
-          <p:cNvPr descr="/uploadFile/125_2.jpg" id="202" name="Google Shape;202;p13"/>
+          <p:cNvPr descr="/uploadFile/125_2.jpg" id="203" name="Google Shape;203;p13"/>
           <p:cNvPicPr preferRelativeResize="0"/>
           <p:nvPr/>
         </p:nvPicPr>
@@ -7644,7 +7857,7 @@
     </p:bg>
     <p:spTree>
       <p:nvGrpSpPr>
-        <p:cNvPr id="207" name="Shape 207"/>
+        <p:cNvPr id="208" name="Shape 208"/>
         <p:cNvGrpSpPr/>
         <p:nvPr/>
       </p:nvGrpSpPr>
@@ -7658,7 +7871,7 @@
       </p:grpSpPr>
       <p:sp>
         <p:nvSpPr>
-          <p:cNvPr id="208" name="Google Shape;208;p14"/>
+          <p:cNvPr id="209" name="Google Shape;209;p14"/>
           <p:cNvSpPr/>
           <p:nvPr/>
         </p:nvSpPr>
@@ -7719,7 +7932,7 @@
       </p:sp>
       <p:pic>
         <p:nvPicPr>
-          <p:cNvPr descr="/uploadFile/125_9.png" id="209" name="Google Shape;209;p14"/>
+          <p:cNvPr descr="/uploadFile/125_9.png" id="210" name="Google Shape;210;p14"/>
           <p:cNvPicPr preferRelativeResize="0"/>
           <p:nvPr/>
         </p:nvPicPr>
@@ -7746,7 +7959,7 @@
       </p:pic>
       <p:sp>
         <p:nvSpPr>
-          <p:cNvPr id="210" name="Google Shape;210;p14"/>
+          <p:cNvPr id="211" name="Google Shape;211;p14"/>
           <p:cNvSpPr/>
           <p:nvPr/>
         </p:nvSpPr>
@@ -7841,7 +8054,7 @@
       </p:sp>
       <p:sp>
         <p:nvSpPr>
-          <p:cNvPr id="211" name="Google Shape;211;p14"/>
+          <p:cNvPr id="212" name="Google Shape;212;p14"/>
           <p:cNvSpPr/>
           <p:nvPr/>
         </p:nvSpPr>
@@ -7906,7 +8119,7 @@
       </p:sp>
       <p:sp>
         <p:nvSpPr>
-          <p:cNvPr id="212" name="Google Shape;212;p14"/>
+          <p:cNvPr id="213" name="Google Shape;213;p14"/>
           <p:cNvSpPr/>
           <p:nvPr/>
         </p:nvSpPr>
@@ -7971,7 +8184,7 @@
       </p:sp>
       <p:pic>
         <p:nvPicPr>
-          <p:cNvPr descr="/uploadFile/125_7.png" id="213" name="Google Shape;213;p14"/>
+          <p:cNvPr descr="/uploadFile/125_7.png" id="214" name="Google Shape;214;p14"/>
           <p:cNvPicPr preferRelativeResize="0"/>
           <p:nvPr/>
         </p:nvPicPr>
@@ -7998,7 +8211,7 @@
       </p:pic>
       <p:sp>
         <p:nvSpPr>
-          <p:cNvPr id="214" name="Google Shape;214;p14"/>
+          <p:cNvPr id="215" name="Google Shape;215;p14"/>
           <p:cNvSpPr/>
           <p:nvPr/>
         </p:nvSpPr>
@@ -8093,7 +8306,7 @@
       </p:sp>
       <p:sp>
         <p:nvSpPr>
-          <p:cNvPr id="215" name="Google Shape;215;p14"/>
+          <p:cNvPr id="216" name="Google Shape;216;p14"/>
           <p:cNvSpPr/>
           <p:nvPr/>
         </p:nvSpPr>
@@ -8158,7 +8371,7 @@
       </p:sp>
       <p:sp>
         <p:nvSpPr>
-          <p:cNvPr id="216" name="Google Shape;216;p14"/>
+          <p:cNvPr id="217" name="Google Shape;217;p14"/>
           <p:cNvSpPr/>
           <p:nvPr/>
         </p:nvSpPr>
@@ -8223,7 +8436,7 @@
       </p:sp>
       <p:pic>
         <p:nvPicPr>
-          <p:cNvPr descr="/uploadFile/125_8.png" id="217" name="Google Shape;217;p14"/>
+          <p:cNvPr descr="/uploadFile/125_8.png" id="218" name="Google Shape;218;p14"/>
           <p:cNvPicPr preferRelativeResize="0"/>
           <p:nvPr/>
         </p:nvPicPr>
@@ -8250,7 +8463,7 @@
       </p:pic>
       <p:sp>
         <p:nvSpPr>
-          <p:cNvPr id="218" name="Google Shape;218;p14"/>
+          <p:cNvPr id="219" name="Google Shape;219;p14"/>
           <p:cNvSpPr/>
           <p:nvPr/>
         </p:nvSpPr>
@@ -8345,7 +8558,7 @@
       </p:sp>
       <p:sp>
         <p:nvSpPr>
-          <p:cNvPr id="219" name="Google Shape;219;p14"/>
+          <p:cNvPr id="220" name="Google Shape;220;p14"/>
           <p:cNvSpPr/>
           <p:nvPr/>
         </p:nvSpPr>
@@ -8410,7 +8623,7 @@
       </p:sp>
       <p:sp>
         <p:nvSpPr>
-          <p:cNvPr id="220" name="Google Shape;220;p14"/>
+          <p:cNvPr id="221" name="Google Shape;221;p14"/>
           <p:cNvSpPr/>
           <p:nvPr/>
         </p:nvSpPr>
@@ -8475,7 +8688,7 @@
       </p:sp>
       <p:pic>
         <p:nvPicPr>
-          <p:cNvPr descr="/uploadFile/125_10.png" id="221" name="Google Shape;221;p14"/>
+          <p:cNvPr descr="/uploadFile/125_10.png" id="222" name="Google Shape;222;p14"/>
           <p:cNvPicPr preferRelativeResize="0"/>
           <p:nvPr/>
         </p:nvPicPr>
@@ -8502,7 +8715,7 @@
       </p:pic>
       <p:sp>
         <p:nvSpPr>
-          <p:cNvPr id="222" name="Google Shape;222;p14"/>
+          <p:cNvPr id="223" name="Google Shape;223;p14"/>
           <p:cNvSpPr/>
           <p:nvPr/>
         </p:nvSpPr>
@@ -8597,7 +8810,7 @@
       </p:sp>
       <p:sp>
         <p:nvSpPr>
-          <p:cNvPr id="223" name="Google Shape;223;p14"/>
+          <p:cNvPr id="224" name="Google Shape;224;p14"/>
           <p:cNvSpPr/>
           <p:nvPr/>
         </p:nvSpPr>
@@ -8662,7 +8875,7 @@
       </p:sp>
       <p:sp>
         <p:nvSpPr>
-          <p:cNvPr id="224" name="Google Shape;224;p14"/>
+          <p:cNvPr id="225" name="Google Shape;225;p14"/>
           <p:cNvSpPr/>
           <p:nvPr/>
         </p:nvSpPr>
@@ -8745,7 +8958,7 @@
     </p:bg>
     <p:spTree>
       <p:nvGrpSpPr>
-        <p:cNvPr id="229" name="Shape 229"/>
+        <p:cNvPr id="230" name="Shape 230"/>
         <p:cNvGrpSpPr/>
         <p:nvPr/>
       </p:nvGrpSpPr>
@@ -8759,7 +8972,7 @@
       </p:grpSpPr>
       <p:sp>
         <p:nvSpPr>
-          <p:cNvPr id="230" name="Google Shape;230;p15"/>
+          <p:cNvPr id="231" name="Google Shape;231;p15"/>
           <p:cNvSpPr/>
           <p:nvPr/>
         </p:nvSpPr>
@@ -8854,7 +9067,7 @@
       </p:sp>
       <p:sp>
         <p:nvSpPr>
-          <p:cNvPr id="231" name="Google Shape;231;p15"/>
+          <p:cNvPr id="232" name="Google Shape;232;p15"/>
           <p:cNvSpPr/>
           <p:nvPr/>
         </p:nvSpPr>
@@ -8949,7 +9162,7 @@
       </p:sp>
       <p:sp>
         <p:nvSpPr>
-          <p:cNvPr id="232" name="Google Shape;232;p15"/>
+          <p:cNvPr id="233" name="Google Shape;233;p15"/>
           <p:cNvSpPr/>
           <p:nvPr/>
         </p:nvSpPr>
@@ -9038,7 +9251,7 @@
       </p:sp>
       <p:sp>
         <p:nvSpPr>
-          <p:cNvPr id="233" name="Google Shape;233;p15"/>
+          <p:cNvPr id="234" name="Google Shape;234;p15"/>
           <p:cNvSpPr/>
           <p:nvPr/>
         </p:nvSpPr>
@@ -9133,7 +9346,7 @@
       </p:sp>
       <p:pic>
         <p:nvPicPr>
-          <p:cNvPr descr="/uploadFile/125_6.jpg" id="234" name="Google Shape;234;p15"/>
+          <p:cNvPr descr="/uploadFile/125_6.jpg" id="235" name="Google Shape;235;p15"/>
           <p:cNvPicPr preferRelativeResize="0"/>
           <p:nvPr/>
         </p:nvPicPr>
@@ -9162,7 +9375,7 @@
       </p:pic>
       <p:pic>
         <p:nvPicPr>
-          <p:cNvPr descr="/uploadFile/125_5.png" id="235" name="Google Shape;235;p15"/>
+          <p:cNvPr descr="/uploadFile/125_5.png" id="236" name="Google Shape;236;p15"/>
           <p:cNvPicPr preferRelativeResize="0"/>
           <p:nvPr/>
         </p:nvPicPr>
@@ -9191,7 +9404,7 @@
       </p:pic>
       <p:pic>
         <p:nvPicPr>
-          <p:cNvPr descr="/uploadFile/125_6.jpg" id="236" name="Google Shape;236;p15"/>
+          <p:cNvPr descr="/uploadFile/125_6.jpg" id="237" name="Google Shape;237;p15"/>
           <p:cNvPicPr preferRelativeResize="0"/>
           <p:nvPr/>
         </p:nvPicPr>
@@ -9220,7 +9433,7 @@
       </p:pic>
       <p:pic>
         <p:nvPicPr>
-          <p:cNvPr descr="/uploadFile/125_6.jpg" id="237" name="Google Shape;237;p15"/>
+          <p:cNvPr descr="/uploadFile/125_6.jpg" id="238" name="Google Shape;238;p15"/>
           <p:cNvPicPr preferRelativeResize="0"/>
           <p:nvPr/>
         </p:nvPicPr>
@@ -9249,7 +9462,7 @@
       </p:pic>
       <p:sp>
         <p:nvSpPr>
-          <p:cNvPr id="238" name="Google Shape;238;p15"/>
+          <p:cNvPr id="239" name="Google Shape;239;p15"/>
           <p:cNvSpPr/>
           <p:nvPr/>
         </p:nvSpPr>
@@ -9310,7 +9523,7 @@
       </p:sp>
       <p:sp>
         <p:nvSpPr>
-          <p:cNvPr id="239" name="Google Shape;239;p15"/>
+          <p:cNvPr id="240" name="Google Shape;240;p15"/>
           <p:cNvSpPr/>
           <p:nvPr/>
         </p:nvSpPr>
@@ -9371,7 +9584,7 @@
       </p:sp>
       <p:sp>
         <p:nvSpPr>
-          <p:cNvPr id="240" name="Google Shape;240;p15"/>
+          <p:cNvPr id="241" name="Google Shape;241;p15"/>
           <p:cNvSpPr/>
           <p:nvPr/>
         </p:nvSpPr>
@@ -9432,7 +9645,7 @@
       </p:sp>
       <p:sp>
         <p:nvSpPr>
-          <p:cNvPr id="241" name="Google Shape;241;p15"/>
+          <p:cNvPr id="242" name="Google Shape;242;p15"/>
           <p:cNvSpPr/>
           <p:nvPr/>
         </p:nvSpPr>
@@ -9493,7 +9706,7 @@
       </p:sp>
       <p:sp>
         <p:nvSpPr>
-          <p:cNvPr id="242" name="Google Shape;242;p15"/>
+          <p:cNvPr id="243" name="Google Shape;243;p15"/>
           <p:cNvSpPr/>
           <p:nvPr/>
         </p:nvSpPr>
@@ -9554,7 +9767,7 @@
       </p:sp>
       <p:sp>
         <p:nvSpPr>
-          <p:cNvPr id="243" name="Google Shape;243;p15"/>
+          <p:cNvPr id="244" name="Google Shape;244;p15"/>
           <p:cNvSpPr/>
           <p:nvPr/>
         </p:nvSpPr>
@@ -9615,7 +9828,7 @@
       </p:sp>
       <p:sp>
         <p:nvSpPr>
-          <p:cNvPr id="244" name="Google Shape;244;p15"/>
+          <p:cNvPr id="245" name="Google Shape;245;p15"/>
           <p:cNvSpPr/>
           <p:nvPr/>
         </p:nvSpPr>
@@ -9676,7 +9889,7 @@
       </p:sp>
       <p:sp>
         <p:nvSpPr>
-          <p:cNvPr id="245" name="Google Shape;245;p15"/>
+          <p:cNvPr id="246" name="Google Shape;246;p15"/>
           <p:cNvSpPr/>
           <p:nvPr/>
         </p:nvSpPr>
@@ -9737,7 +9950,7 @@
       </p:sp>
       <p:sp>
         <p:nvSpPr>
-          <p:cNvPr id="246" name="Google Shape;246;p15"/>
+          <p:cNvPr id="247" name="Google Shape;247;p15"/>
           <p:cNvSpPr/>
           <p:nvPr/>
         </p:nvSpPr>
@@ -9816,7 +10029,7 @@
     </p:bg>
     <p:spTree>
       <p:nvGrpSpPr>
-        <p:cNvPr id="251" name="Shape 251"/>
+        <p:cNvPr id="252" name="Shape 252"/>
         <p:cNvGrpSpPr/>
         <p:nvPr/>
       </p:nvGrpSpPr>
@@ -9830,7 +10043,7 @@
       </p:grpSpPr>
       <p:sp>
         <p:nvSpPr>
-          <p:cNvPr id="252" name="Google Shape;252;p16"/>
+          <p:cNvPr id="253" name="Google Shape;253;p16"/>
           <p:cNvSpPr/>
           <p:nvPr/>
         </p:nvSpPr>
@@ -9891,7 +10104,7 @@
       </p:sp>
       <p:sp>
         <p:nvSpPr>
-          <p:cNvPr id="253" name="Google Shape;253;p16"/>
+          <p:cNvPr id="254" name="Google Shape;254;p16"/>
           <p:cNvSpPr/>
           <p:nvPr/>
         </p:nvSpPr>
@@ -9978,7 +10191,7 @@
       </p:sp>
       <p:sp>
         <p:nvSpPr>
-          <p:cNvPr id="254" name="Google Shape;254;p16"/>
+          <p:cNvPr id="255" name="Google Shape;255;p16"/>
           <p:cNvSpPr/>
           <p:nvPr/>
         </p:nvSpPr>
@@ -10073,7 +10286,7 @@
       </p:sp>
       <p:sp>
         <p:nvSpPr>
-          <p:cNvPr id="255" name="Google Shape;255;p16"/>
+          <p:cNvPr id="256" name="Google Shape;256;p16"/>
           <p:cNvSpPr/>
           <p:nvPr/>
         </p:nvSpPr>
@@ -10160,7 +10373,7 @@
       </p:sp>
       <p:sp>
         <p:nvSpPr>
-          <p:cNvPr id="256" name="Google Shape;256;p16"/>
+          <p:cNvPr id="257" name="Google Shape;257;p16"/>
           <p:cNvSpPr/>
           <p:nvPr/>
         </p:nvSpPr>
@@ -10255,7 +10468,7 @@
       </p:sp>
       <p:sp>
         <p:nvSpPr>
-          <p:cNvPr id="257" name="Google Shape;257;p16"/>
+          <p:cNvPr id="258" name="Google Shape;258;p16"/>
           <p:cNvSpPr/>
           <p:nvPr/>
         </p:nvSpPr>
@@ -10316,7 +10529,7 @@
       </p:sp>
       <p:sp>
         <p:nvSpPr>
-          <p:cNvPr id="258" name="Google Shape;258;p16"/>
+          <p:cNvPr id="259" name="Google Shape;259;p16"/>
           <p:cNvSpPr/>
           <p:nvPr/>
         </p:nvSpPr>
@@ -10377,7 +10590,7 @@
       </p:sp>
       <p:sp>
         <p:nvSpPr>
-          <p:cNvPr id="259" name="Google Shape;259;p16"/>
+          <p:cNvPr id="260" name="Google Shape;260;p16"/>
           <p:cNvSpPr/>
           <p:nvPr/>
         </p:nvSpPr>
@@ -10438,7 +10651,7 @@
       </p:sp>
       <p:sp>
         <p:nvSpPr>
-          <p:cNvPr id="260" name="Google Shape;260;p16"/>
+          <p:cNvPr id="261" name="Google Shape;261;p16"/>
           <p:cNvSpPr/>
           <p:nvPr/>
         </p:nvSpPr>
@@ -10499,7 +10712,7 @@
       </p:sp>
       <p:sp>
         <p:nvSpPr>
-          <p:cNvPr id="261" name="Google Shape;261;p16"/>
+          <p:cNvPr id="262" name="Google Shape;262;p16"/>
           <p:cNvSpPr/>
           <p:nvPr/>
         </p:nvSpPr>
@@ -10560,7 +10773,7 @@
       </p:sp>
       <p:sp>
         <p:nvSpPr>
-          <p:cNvPr id="262" name="Google Shape;262;p16"/>
+          <p:cNvPr id="263" name="Google Shape;263;p16"/>
           <p:cNvSpPr/>
           <p:nvPr/>
         </p:nvSpPr>
@@ -10621,7 +10834,7 @@
       </p:sp>
       <p:sp>
         <p:nvSpPr>
-          <p:cNvPr id="263" name="Google Shape;263;p16"/>
+          <p:cNvPr id="264" name="Google Shape;264;p16"/>
           <p:cNvSpPr/>
           <p:nvPr/>
         </p:nvSpPr>
@@ -10682,7 +10895,7 @@
       </p:sp>
       <p:sp>
         <p:nvSpPr>
-          <p:cNvPr id="264" name="Google Shape;264;p16"/>
+          <p:cNvPr id="265" name="Google Shape;265;p16"/>
           <p:cNvSpPr/>
           <p:nvPr/>
         </p:nvSpPr>
@@ -10761,7 +10974,7 @@
     </p:bg>
     <p:spTree>
       <p:nvGrpSpPr>
-        <p:cNvPr id="269" name="Shape 269"/>
+        <p:cNvPr id="270" name="Shape 270"/>
         <p:cNvGrpSpPr/>
         <p:nvPr/>
       </p:nvGrpSpPr>
@@ -10775,7 +10988,7 @@
       </p:grpSpPr>
       <p:pic>
         <p:nvPicPr>
-          <p:cNvPr descr="/uploadFile/125_5.png" id="270" name="Google Shape;270;p17"/>
+          <p:cNvPr descr="/uploadFile/125_5.png" id="271" name="Google Shape;271;p17"/>
           <p:cNvPicPr preferRelativeResize="0"/>
           <p:nvPr/>
         </p:nvPicPr>
@@ -10802,7 +11015,7 @@
       </p:pic>
       <p:sp>
         <p:nvSpPr>
-          <p:cNvPr id="271" name="Google Shape;271;p17"/>
+          <p:cNvPr id="272" name="Google Shape;272;p17"/>
           <p:cNvSpPr/>
           <p:nvPr/>
         </p:nvSpPr>
@@ -10863,7 +11076,7 @@
       </p:sp>
       <p:sp>
         <p:nvSpPr>
-          <p:cNvPr id="272" name="Google Shape;272;p17"/>
+          <p:cNvPr id="273" name="Google Shape;273;p17"/>
           <p:cNvSpPr/>
           <p:nvPr/>
         </p:nvSpPr>
@@ -10933,7 +11146,7 @@
     </p:bg>
     <p:spTree>
       <p:nvGrpSpPr>
-        <p:cNvPr id="19" name="Shape 19"/>
+        <p:cNvPr id="20" name="Shape 20"/>
         <p:cNvGrpSpPr/>
         <p:nvPr/>
       </p:nvGrpSpPr>
@@ -10947,7 +11160,7 @@
       </p:grpSpPr>
       <p:sp>
         <p:nvSpPr>
-          <p:cNvPr id="20" name="Google Shape;20;p2"/>
+          <p:cNvPr id="21" name="Google Shape;21;p2"/>
           <p:cNvSpPr/>
           <p:nvPr/>
         </p:nvSpPr>
@@ -11015,7 +11228,7 @@
       </p:sp>
       <p:sp>
         <p:nvSpPr>
-          <p:cNvPr id="21" name="Google Shape;21;p2"/>
+          <p:cNvPr id="22" name="Google Shape;22;p2"/>
           <p:cNvSpPr/>
           <p:nvPr/>
         </p:nvSpPr>
@@ -11076,7 +11289,7 @@
       </p:sp>
       <p:pic>
         <p:nvPicPr>
-          <p:cNvPr descr="/uploadFile/125_2.jpg" id="22" name="Google Shape;22;p2"/>
+          <p:cNvPr descr="/uploadFile/125_2.jpg" id="23" name="Google Shape;23;p2"/>
           <p:cNvPicPr preferRelativeResize="0"/>
           <p:nvPr/>
         </p:nvPicPr>
@@ -11123,7 +11336,7 @@
     </p:bg>
     <p:spTree>
       <p:nvGrpSpPr>
-        <p:cNvPr id="27" name="Shape 27"/>
+        <p:cNvPr id="28" name="Shape 28"/>
         <p:cNvGrpSpPr/>
         <p:nvPr/>
       </p:nvGrpSpPr>
@@ -11137,7 +11350,7 @@
       </p:grpSpPr>
       <p:sp>
         <p:nvSpPr>
-          <p:cNvPr id="28" name="Google Shape;28;p3"/>
+          <p:cNvPr id="29" name="Google Shape;29;p3"/>
           <p:cNvSpPr/>
           <p:nvPr/>
         </p:nvSpPr>
@@ -11198,7 +11411,7 @@
       </p:sp>
       <p:sp>
         <p:nvSpPr>
-          <p:cNvPr id="29" name="Google Shape;29;p3"/>
+          <p:cNvPr id="30" name="Google Shape;30;p3"/>
           <p:cNvSpPr/>
           <p:nvPr/>
         </p:nvSpPr>
@@ -11293,7 +11506,7 @@
       </p:sp>
       <p:sp>
         <p:nvSpPr>
-          <p:cNvPr id="30" name="Google Shape;30;p3"/>
+          <p:cNvPr id="31" name="Google Shape;31;p3"/>
           <p:cNvSpPr/>
           <p:nvPr/>
         </p:nvSpPr>
@@ -11354,7 +11567,7 @@
       </p:sp>
       <p:sp>
         <p:nvSpPr>
-          <p:cNvPr id="31" name="Google Shape;31;p3"/>
+          <p:cNvPr id="32" name="Google Shape;32;p3"/>
           <p:cNvSpPr/>
           <p:nvPr/>
         </p:nvSpPr>
@@ -11460,7 +11673,7 @@
       </p:sp>
       <p:sp>
         <p:nvSpPr>
-          <p:cNvPr id="32" name="Google Shape;32;p3"/>
+          <p:cNvPr id="33" name="Google Shape;33;p3"/>
           <p:cNvSpPr/>
           <p:nvPr/>
         </p:nvSpPr>
@@ -11549,7 +11762,7 @@
       </p:sp>
       <p:sp>
         <p:nvSpPr>
-          <p:cNvPr id="33" name="Google Shape;33;p3"/>
+          <p:cNvPr id="34" name="Google Shape;34;p3"/>
           <p:cNvSpPr/>
           <p:nvPr/>
         </p:nvSpPr>
@@ -11610,7 +11823,7 @@
       </p:sp>
       <p:sp>
         <p:nvSpPr>
-          <p:cNvPr id="34" name="Google Shape;34;p3"/>
+          <p:cNvPr id="35" name="Google Shape;35;p3"/>
           <p:cNvSpPr/>
           <p:nvPr/>
         </p:nvSpPr>
@@ -11671,7 +11884,7 @@
       </p:sp>
       <p:sp>
         <p:nvSpPr>
-          <p:cNvPr id="35" name="Google Shape;35;p3"/>
+          <p:cNvPr id="36" name="Google Shape;36;p3"/>
           <p:cNvSpPr/>
           <p:nvPr/>
         </p:nvSpPr>
@@ -11766,7 +11979,7 @@
       </p:sp>
       <p:sp>
         <p:nvSpPr>
-          <p:cNvPr id="36" name="Google Shape;36;p3"/>
+          <p:cNvPr id="37" name="Google Shape;37;p3"/>
           <p:cNvSpPr/>
           <p:nvPr/>
         </p:nvSpPr>
@@ -11827,7 +12040,7 @@
       </p:sp>
       <p:sp>
         <p:nvSpPr>
-          <p:cNvPr id="37" name="Google Shape;37;p3"/>
+          <p:cNvPr id="38" name="Google Shape;38;p3"/>
           <p:cNvSpPr/>
           <p:nvPr/>
         </p:nvSpPr>
@@ -11888,7 +12101,7 @@
       </p:sp>
       <p:sp>
         <p:nvSpPr>
-          <p:cNvPr id="38" name="Google Shape;38;p3"/>
+          <p:cNvPr id="39" name="Google Shape;39;p3"/>
           <p:cNvSpPr/>
           <p:nvPr/>
         </p:nvSpPr>
@@ -11967,7 +12180,7 @@
       </p:sp>
       <p:sp>
         <p:nvSpPr>
-          <p:cNvPr id="39" name="Google Shape;39;p3"/>
+          <p:cNvPr id="40" name="Google Shape;40;p3"/>
           <p:cNvSpPr/>
           <p:nvPr/>
         </p:nvSpPr>
@@ -12046,7 +12259,7 @@
       </p:sp>
       <p:sp>
         <p:nvSpPr>
-          <p:cNvPr id="40" name="Google Shape;40;p3"/>
+          <p:cNvPr id="41" name="Google Shape;41;p3"/>
           <p:cNvSpPr/>
           <p:nvPr/>
         </p:nvSpPr>
@@ -12125,7 +12338,7 @@
       </p:sp>
       <p:sp>
         <p:nvSpPr>
-          <p:cNvPr id="41" name="Google Shape;41;p3"/>
+          <p:cNvPr id="42" name="Google Shape;42;p3"/>
           <p:cNvSpPr/>
           <p:nvPr/>
         </p:nvSpPr>
@@ -12186,7 +12399,7 @@
       </p:sp>
       <p:sp>
         <p:nvSpPr>
-          <p:cNvPr id="42" name="Google Shape;42;p3"/>
+          <p:cNvPr id="43" name="Google Shape;43;p3"/>
           <p:cNvSpPr/>
           <p:nvPr/>
         </p:nvSpPr>
@@ -12247,7 +12460,7 @@
       </p:sp>
       <p:sp>
         <p:nvSpPr>
-          <p:cNvPr id="43" name="Google Shape;43;p3"/>
+          <p:cNvPr id="44" name="Google Shape;44;p3"/>
           <p:cNvSpPr/>
           <p:nvPr/>
         </p:nvSpPr>
@@ -12326,7 +12539,7 @@
     </p:bg>
     <p:spTree>
       <p:nvGrpSpPr>
-        <p:cNvPr id="48" name="Shape 48"/>
+        <p:cNvPr id="49" name="Shape 49"/>
         <p:cNvGrpSpPr/>
         <p:nvPr/>
       </p:nvGrpSpPr>
@@ -12340,7 +12553,7 @@
       </p:grpSpPr>
       <p:sp>
         <p:nvSpPr>
-          <p:cNvPr id="49" name="Google Shape;49;p4"/>
+          <p:cNvPr id="50" name="Google Shape;50;p4"/>
           <p:cNvSpPr/>
           <p:nvPr/>
         </p:nvSpPr>
@@ -12401,7 +12614,7 @@
       </p:sp>
       <p:sp>
         <p:nvSpPr>
-          <p:cNvPr id="50" name="Google Shape;50;p4"/>
+          <p:cNvPr id="51" name="Google Shape;51;p4"/>
           <p:cNvSpPr/>
           <p:nvPr/>
         </p:nvSpPr>
@@ -12480,7 +12693,7 @@
       </p:sp>
       <p:sp>
         <p:nvSpPr>
-          <p:cNvPr id="51" name="Google Shape;51;p4"/>
+          <p:cNvPr id="52" name="Google Shape;52;p4"/>
           <p:cNvSpPr/>
           <p:nvPr/>
         </p:nvSpPr>
@@ -12559,7 +12772,7 @@
       </p:sp>
       <p:sp>
         <p:nvSpPr>
-          <p:cNvPr id="52" name="Google Shape;52;p4"/>
+          <p:cNvPr id="53" name="Google Shape;53;p4"/>
           <p:cNvSpPr/>
           <p:nvPr/>
         </p:nvSpPr>
@@ -12620,7 +12833,7 @@
       </p:sp>
       <p:sp>
         <p:nvSpPr>
-          <p:cNvPr id="53" name="Google Shape;53;p4"/>
+          <p:cNvPr id="54" name="Google Shape;54;p4"/>
           <p:cNvSpPr/>
           <p:nvPr/>
         </p:nvSpPr>
@@ -12681,7 +12894,7 @@
       </p:sp>
       <p:sp>
         <p:nvSpPr>
-          <p:cNvPr id="54" name="Google Shape;54;p4"/>
+          <p:cNvPr id="55" name="Google Shape;55;p4"/>
           <p:cNvSpPr/>
           <p:nvPr/>
         </p:nvSpPr>
@@ -12768,7 +12981,7 @@
       </p:sp>
       <p:sp>
         <p:nvSpPr>
-          <p:cNvPr id="55" name="Google Shape;55;p4"/>
+          <p:cNvPr id="56" name="Google Shape;56;p4"/>
           <p:cNvSpPr/>
           <p:nvPr/>
         </p:nvSpPr>
@@ -12829,7 +13042,7 @@
       </p:sp>
       <p:sp>
         <p:nvSpPr>
-          <p:cNvPr id="56" name="Google Shape;56;p4"/>
+          <p:cNvPr id="57" name="Google Shape;57;p4"/>
           <p:cNvSpPr/>
           <p:nvPr/>
         </p:nvSpPr>
@@ -12901,7 +13114,7 @@
       </p:sp>
       <p:sp>
         <p:nvSpPr>
-          <p:cNvPr id="57" name="Google Shape;57;p4"/>
+          <p:cNvPr id="58" name="Google Shape;58;p4"/>
           <p:cNvSpPr/>
           <p:nvPr/>
         </p:nvSpPr>
@@ -12962,7 +13175,7 @@
       </p:sp>
       <p:sp>
         <p:nvSpPr>
-          <p:cNvPr id="58" name="Google Shape;58;p4"/>
+          <p:cNvPr id="59" name="Google Shape;59;p4"/>
           <p:cNvSpPr/>
           <p:nvPr/>
         </p:nvSpPr>
@@ -13023,7 +13236,7 @@
       </p:sp>
       <p:sp>
         <p:nvSpPr>
-          <p:cNvPr id="59" name="Google Shape;59;p4"/>
+          <p:cNvPr id="60" name="Google Shape;60;p4"/>
           <p:cNvSpPr/>
           <p:nvPr/>
         </p:nvSpPr>
@@ -13088,7 +13301,7 @@
       </p:sp>
       <p:pic>
         <p:nvPicPr>
-          <p:cNvPr descr="/uploadFile/125_2.jpg" id="60" name="Google Shape;60;p4"/>
+          <p:cNvPr descr="/uploadFile/125_2.jpg" id="61" name="Google Shape;61;p4"/>
           <p:cNvPicPr preferRelativeResize="0"/>
           <p:nvPr/>
         </p:nvPicPr>
@@ -13117,7 +13330,7 @@
       </p:pic>
       <p:pic>
         <p:nvPicPr>
-          <p:cNvPr descr="/uploadFile/125_2.jpg" id="61" name="Google Shape;61;p4"/>
+          <p:cNvPr descr="/uploadFile/125_2.jpg" id="62" name="Google Shape;62;p4"/>
           <p:cNvPicPr preferRelativeResize="0"/>
           <p:nvPr/>
         </p:nvPicPr>
@@ -13146,7 +13359,7 @@
       </p:pic>
       <p:pic>
         <p:nvPicPr>
-          <p:cNvPr descr="/uploadFile/125_2.jpg" id="62" name="Google Shape;62;p4"/>
+          <p:cNvPr descr="/uploadFile/125_2.jpg" id="63" name="Google Shape;63;p4"/>
           <p:cNvPicPr preferRelativeResize="0"/>
           <p:nvPr/>
         </p:nvPicPr>
@@ -13193,7 +13406,7 @@
     </p:bg>
     <p:spTree>
       <p:nvGrpSpPr>
-        <p:cNvPr id="67" name="Shape 67"/>
+        <p:cNvPr id="68" name="Shape 68"/>
         <p:cNvGrpSpPr/>
         <p:nvPr/>
       </p:nvGrpSpPr>
@@ -13207,7 +13420,7 @@
       </p:grpSpPr>
       <p:sp>
         <p:nvSpPr>
-          <p:cNvPr id="68" name="Google Shape;68;p5"/>
+          <p:cNvPr id="69" name="Google Shape;69;p5"/>
           <p:cNvSpPr/>
           <p:nvPr/>
         </p:nvSpPr>
@@ -13275,7 +13488,7 @@
       </p:sp>
       <p:sp>
         <p:nvSpPr>
-          <p:cNvPr id="69" name="Google Shape;69;p5"/>
+          <p:cNvPr id="70" name="Google Shape;70;p5"/>
           <p:cNvSpPr/>
           <p:nvPr/>
         </p:nvSpPr>
@@ -13336,7 +13549,7 @@
       </p:sp>
       <p:pic>
         <p:nvPicPr>
-          <p:cNvPr descr="/uploadFile/125_2.jpg" id="70" name="Google Shape;70;p5"/>
+          <p:cNvPr descr="/uploadFile/125_2.jpg" id="71" name="Google Shape;71;p5"/>
           <p:cNvPicPr preferRelativeResize="0"/>
           <p:nvPr/>
         </p:nvPicPr>
@@ -13383,7 +13596,7 @@
     </p:bg>
     <p:spTree>
       <p:nvGrpSpPr>
-        <p:cNvPr id="75" name="Shape 75"/>
+        <p:cNvPr id="76" name="Shape 76"/>
         <p:cNvGrpSpPr/>
         <p:nvPr/>
       </p:nvGrpSpPr>
@@ -13397,7 +13610,7 @@
       </p:grpSpPr>
       <p:sp>
         <p:nvSpPr>
-          <p:cNvPr id="76" name="Google Shape;76;p6"/>
+          <p:cNvPr id="77" name="Google Shape;77;p6"/>
           <p:cNvSpPr/>
           <p:nvPr/>
         </p:nvSpPr>
@@ -13442,7 +13655,27 @@
                 <a:cs typeface="Arial"/>
                 <a:sym typeface="Arial"/>
               </a:rPr>
-              <a:t>Game Board Representation Alternatives</a:t>
+              <a:t>Game </a:t>
+            </a:r>
+            <a:r>
+              <a:rPr b="1" lang="en-US" sz="2100">
+                <a:solidFill>
+                  <a:srgbClr val="BD9052"/>
+                </a:solidFill>
+              </a:rPr>
+              <a:t>Status </a:t>
+            </a:r>
+            <a:r>
+              <a:rPr b="1" lang="en-US" sz="2100">
+                <a:solidFill>
+                  <a:srgbClr val="BD9052"/>
+                </a:solidFill>
+                <a:latin typeface="Arial"/>
+                <a:ea typeface="Arial"/>
+                <a:cs typeface="Arial"/>
+                <a:sym typeface="Arial"/>
+              </a:rPr>
+              <a:t>Representation</a:t>
             </a:r>
             <a:endParaRPr sz="1500">
               <a:solidFill>
@@ -13458,13 +13691,13 @@
       </p:sp>
       <p:sp>
         <p:nvSpPr>
-          <p:cNvPr id="77" name="Google Shape;77;p6"/>
+          <p:cNvPr id="78" name="Google Shape;78;p6"/>
           <p:cNvSpPr/>
           <p:nvPr/>
         </p:nvSpPr>
         <p:spPr>
           <a:xfrm>
-            <a:off x="697686" y="2302488"/>
+            <a:off x="-7894114" y="1236751"/>
             <a:ext cx="5852160" cy="1208853"/>
           </a:xfrm>
           <a:custGeom>
@@ -13553,14 +13786,14 @@
       </p:sp>
       <p:sp>
         <p:nvSpPr>
-          <p:cNvPr id="78" name="Google Shape;78;p6"/>
+          <p:cNvPr id="79" name="Google Shape;79;p6"/>
           <p:cNvSpPr/>
           <p:nvPr/>
         </p:nvSpPr>
         <p:spPr>
           <a:xfrm>
-            <a:off x="715004" y="2320776"/>
-            <a:ext cx="5834842" cy="369332"/>
+            <a:off x="-7876796" y="1255039"/>
+            <a:ext cx="5834700" cy="369300"/>
           </a:xfrm>
           <a:prstGeom prst="rect">
             <a:avLst/>
@@ -13614,14 +13847,14 @@
       </p:sp>
       <p:sp>
         <p:nvSpPr>
-          <p:cNvPr id="79" name="Google Shape;79;p6"/>
+          <p:cNvPr id="80" name="Google Shape;80;p6"/>
           <p:cNvSpPr/>
           <p:nvPr/>
         </p:nvSpPr>
         <p:spPr>
           <a:xfrm>
-            <a:off x="715004" y="2596940"/>
-            <a:ext cx="5834842" cy="365760"/>
+            <a:off x="-7876796" y="1531203"/>
+            <a:ext cx="5834700" cy="365700"/>
           </a:xfrm>
           <a:prstGeom prst="rect">
             <a:avLst/>
@@ -13675,13 +13908,13 @@
       </p:sp>
       <p:sp>
         <p:nvSpPr>
-          <p:cNvPr id="80" name="Google Shape;80;p6"/>
+          <p:cNvPr id="81" name="Google Shape;81;p6"/>
           <p:cNvSpPr/>
           <p:nvPr/>
         </p:nvSpPr>
         <p:spPr>
           <a:xfrm>
-            <a:off x="697686" y="942296"/>
+            <a:off x="628486" y="1896896"/>
             <a:ext cx="5852160" cy="1208853"/>
           </a:xfrm>
           <a:custGeom>
@@ -13770,14 +14003,14 @@
       </p:sp>
       <p:sp>
         <p:nvSpPr>
-          <p:cNvPr id="81" name="Google Shape;81;p6"/>
+          <p:cNvPr id="82" name="Google Shape;82;p6"/>
           <p:cNvSpPr/>
           <p:nvPr/>
         </p:nvSpPr>
         <p:spPr>
           <a:xfrm>
-            <a:off x="715004" y="960584"/>
-            <a:ext cx="5834842" cy="369332"/>
+            <a:off x="645804" y="1915184"/>
+            <a:ext cx="5834700" cy="369300"/>
           </a:xfrm>
           <a:prstGeom prst="rect">
             <a:avLst/>
@@ -13831,14 +14064,14 @@
       </p:sp>
       <p:sp>
         <p:nvSpPr>
-          <p:cNvPr id="82" name="Google Shape;82;p6"/>
+          <p:cNvPr id="83" name="Google Shape;83;p6"/>
           <p:cNvSpPr/>
           <p:nvPr/>
         </p:nvSpPr>
         <p:spPr>
           <a:xfrm>
-            <a:off x="715004" y="1236748"/>
-            <a:ext cx="5834842" cy="365760"/>
+            <a:off x="645804" y="2191348"/>
+            <a:ext cx="5834700" cy="365700"/>
           </a:xfrm>
           <a:prstGeom prst="rect">
             <a:avLst/>
@@ -13928,13 +14161,13 @@
       </p:sp>
       <p:sp>
         <p:nvSpPr>
-          <p:cNvPr id="83" name="Google Shape;83;p6"/>
+          <p:cNvPr id="84" name="Google Shape;84;p6"/>
           <p:cNvSpPr/>
           <p:nvPr/>
         </p:nvSpPr>
         <p:spPr>
           <a:xfrm>
-            <a:off x="697686" y="3662679"/>
+            <a:off x="-7894114" y="2596942"/>
             <a:ext cx="5852160" cy="1208853"/>
           </a:xfrm>
           <a:custGeom>
@@ -14023,14 +14256,14 @@
       </p:sp>
       <p:sp>
         <p:nvSpPr>
-          <p:cNvPr id="84" name="Google Shape;84;p6"/>
+          <p:cNvPr id="85" name="Google Shape;85;p6"/>
           <p:cNvSpPr/>
           <p:nvPr/>
         </p:nvSpPr>
         <p:spPr>
           <a:xfrm>
-            <a:off x="715004" y="3680967"/>
-            <a:ext cx="5834842" cy="369332"/>
+            <a:off x="-7876796" y="2615230"/>
+            <a:ext cx="5834700" cy="369300"/>
           </a:xfrm>
           <a:prstGeom prst="rect">
             <a:avLst/>
@@ -14092,14 +14325,14 @@
       </p:sp>
       <p:sp>
         <p:nvSpPr>
-          <p:cNvPr id="85" name="Google Shape;85;p6"/>
+          <p:cNvPr id="86" name="Google Shape;86;p6"/>
           <p:cNvSpPr/>
           <p:nvPr/>
         </p:nvSpPr>
         <p:spPr>
           <a:xfrm>
-            <a:off x="715004" y="3957132"/>
-            <a:ext cx="5834842" cy="365760"/>
+            <a:off x="-7876796" y="2891395"/>
+            <a:ext cx="5834700" cy="365700"/>
           </a:xfrm>
           <a:prstGeom prst="rect">
             <a:avLst/>
@@ -14161,7 +14394,7 @@
       </p:sp>
       <p:pic>
         <p:nvPicPr>
-          <p:cNvPr descr="/uploadFile/125_1.jpg" id="86" name="Google Shape;86;p6"/>
+          <p:cNvPr descr="/uploadFile/125_1.jpg" id="87" name="Google Shape;87;p6"/>
           <p:cNvPicPr preferRelativeResize="0"/>
           <p:nvPr/>
         </p:nvPicPr>
@@ -14174,8 +14407,8 @@
         </p:blipFill>
         <p:spPr>
           <a:xfrm>
-            <a:off x="7052481" y="2540397"/>
-            <a:ext cx="1323804" cy="733033"/>
+            <a:off x="-1539319" y="1474660"/>
+            <a:ext cx="1323900" cy="732900"/>
           </a:xfrm>
           <a:prstGeom prst="chevron">
             <a:avLst>
@@ -14190,7 +14423,7 @@
       </p:pic>
       <p:pic>
         <p:nvPicPr>
-          <p:cNvPr descr="/uploadFile/125_5.png" id="87" name="Google Shape;87;p6"/>
+          <p:cNvPr descr="/uploadFile/125_5.png" id="88" name="Google Shape;88;p6"/>
           <p:cNvPicPr preferRelativeResize="0"/>
           <p:nvPr/>
         </p:nvPicPr>
@@ -14203,8 +14436,8 @@
         </p:blipFill>
         <p:spPr>
           <a:xfrm>
-            <a:off x="6844135" y="1079036"/>
-            <a:ext cx="1740495" cy="935372"/>
+            <a:off x="6774935" y="2033636"/>
+            <a:ext cx="1740600" cy="935400"/>
           </a:xfrm>
           <a:prstGeom prst="chevron">
             <a:avLst>
@@ -14219,7 +14452,7 @@
       </p:pic>
       <p:pic>
         <p:nvPicPr>
-          <p:cNvPr descr="/uploadFile/125_5.png" id="88" name="Google Shape;88;p6"/>
+          <p:cNvPr descr="/uploadFile/125_5.png" id="89" name="Google Shape;89;p6"/>
           <p:cNvPicPr preferRelativeResize="0"/>
           <p:nvPr/>
         </p:nvPicPr>
@@ -14232,8 +14465,8 @@
         </p:blipFill>
         <p:spPr>
           <a:xfrm>
-            <a:off x="7200815" y="3813513"/>
-            <a:ext cx="1027136" cy="652998"/>
+            <a:off x="-1390985" y="2747775"/>
+            <a:ext cx="1027200" cy="653100"/>
           </a:xfrm>
           <a:prstGeom prst="chevron">
             <a:avLst>
@@ -14266,7 +14499,7 @@
     </p:bg>
     <p:spTree>
       <p:nvGrpSpPr>
-        <p:cNvPr id="93" name="Shape 93"/>
+        <p:cNvPr id="94" name="Shape 94"/>
         <p:cNvGrpSpPr/>
         <p:nvPr/>
       </p:nvGrpSpPr>
@@ -14280,7 +14513,7 @@
       </p:grpSpPr>
       <p:sp>
         <p:nvSpPr>
-          <p:cNvPr id="94" name="Google Shape;94;p7"/>
+          <p:cNvPr id="95" name="Google Shape;95;p7"/>
           <p:cNvSpPr/>
           <p:nvPr/>
         </p:nvSpPr>
@@ -14341,7 +14574,7 @@
       </p:sp>
       <p:sp>
         <p:nvSpPr>
-          <p:cNvPr id="95" name="Google Shape;95;p7"/>
+          <p:cNvPr id="96" name="Google Shape;96;p7"/>
           <p:cNvSpPr/>
           <p:nvPr/>
         </p:nvSpPr>
@@ -14436,7 +14669,7 @@
       </p:sp>
       <p:sp>
         <p:nvSpPr>
-          <p:cNvPr id="96" name="Google Shape;96;p7"/>
+          <p:cNvPr id="97" name="Google Shape;97;p7"/>
           <p:cNvSpPr/>
           <p:nvPr/>
         </p:nvSpPr>
@@ -14497,7 +14730,7 @@
       </p:sp>
       <p:sp>
         <p:nvSpPr>
-          <p:cNvPr id="97" name="Google Shape;97;p7"/>
+          <p:cNvPr id="98" name="Google Shape;98;p7"/>
           <p:cNvSpPr/>
           <p:nvPr/>
         </p:nvSpPr>
@@ -14558,7 +14791,7 @@
       </p:sp>
       <p:sp>
         <p:nvSpPr>
-          <p:cNvPr id="98" name="Google Shape;98;p7"/>
+          <p:cNvPr id="99" name="Google Shape;99;p7"/>
           <p:cNvSpPr/>
           <p:nvPr/>
         </p:nvSpPr>
@@ -14647,7 +14880,7 @@
       </p:sp>
       <p:sp>
         <p:nvSpPr>
-          <p:cNvPr id="99" name="Google Shape;99;p7"/>
+          <p:cNvPr id="100" name="Google Shape;100;p7"/>
           <p:cNvSpPr/>
           <p:nvPr/>
         </p:nvSpPr>
@@ -14708,7 +14941,7 @@
       </p:sp>
       <p:sp>
         <p:nvSpPr>
-          <p:cNvPr id="100" name="Google Shape;100;p7"/>
+          <p:cNvPr id="101" name="Google Shape;101;p7"/>
           <p:cNvSpPr/>
           <p:nvPr/>
         </p:nvSpPr>
@@ -14769,7 +15002,7 @@
       </p:sp>
       <p:sp>
         <p:nvSpPr>
-          <p:cNvPr id="101" name="Google Shape;101;p7"/>
+          <p:cNvPr id="102" name="Google Shape;102;p7"/>
           <p:cNvSpPr/>
           <p:nvPr/>
         </p:nvSpPr>
@@ -14864,7 +15097,7 @@
       </p:sp>
       <p:sp>
         <p:nvSpPr>
-          <p:cNvPr id="102" name="Google Shape;102;p7"/>
+          <p:cNvPr id="103" name="Google Shape;103;p7"/>
           <p:cNvSpPr/>
           <p:nvPr/>
         </p:nvSpPr>
@@ -14925,7 +15158,7 @@
       </p:sp>
       <p:sp>
         <p:nvSpPr>
-          <p:cNvPr id="103" name="Google Shape;103;p7"/>
+          <p:cNvPr id="104" name="Google Shape;104;p7"/>
           <p:cNvSpPr/>
           <p:nvPr/>
         </p:nvSpPr>
@@ -14986,7 +15219,7 @@
       </p:sp>
       <p:sp>
         <p:nvSpPr>
-          <p:cNvPr id="104" name="Google Shape;104;p7"/>
+          <p:cNvPr id="105" name="Google Shape;105;p7"/>
           <p:cNvSpPr/>
           <p:nvPr/>
         </p:nvSpPr>
@@ -15065,7 +15298,7 @@
       </p:sp>
       <p:sp>
         <p:nvSpPr>
-          <p:cNvPr id="105" name="Google Shape;105;p7"/>
+          <p:cNvPr id="106" name="Google Shape;106;p7"/>
           <p:cNvSpPr/>
           <p:nvPr/>
         </p:nvSpPr>
@@ -15144,7 +15377,7 @@
       </p:sp>
       <p:sp>
         <p:nvSpPr>
-          <p:cNvPr id="106" name="Google Shape;106;p7"/>
+          <p:cNvPr id="107" name="Google Shape;107;p7"/>
           <p:cNvSpPr/>
           <p:nvPr/>
         </p:nvSpPr>
@@ -15223,7 +15456,7 @@
       </p:sp>
       <p:sp>
         <p:nvSpPr>
-          <p:cNvPr id="107" name="Google Shape;107;p7"/>
+          <p:cNvPr id="108" name="Google Shape;108;p7"/>
           <p:cNvSpPr/>
           <p:nvPr/>
         </p:nvSpPr>
@@ -15284,7 +15517,7 @@
       </p:sp>
       <p:sp>
         <p:nvSpPr>
-          <p:cNvPr id="108" name="Google Shape;108;p7"/>
+          <p:cNvPr id="109" name="Google Shape;109;p7"/>
           <p:cNvSpPr/>
           <p:nvPr/>
         </p:nvSpPr>
@@ -15345,7 +15578,7 @@
       </p:sp>
       <p:sp>
         <p:nvSpPr>
-          <p:cNvPr id="109" name="Google Shape;109;p7"/>
+          <p:cNvPr id="110" name="Google Shape;110;p7"/>
           <p:cNvSpPr/>
           <p:nvPr/>
         </p:nvSpPr>
@@ -15424,7 +15657,7 @@
     </p:bg>
     <p:spTree>
       <p:nvGrpSpPr>
-        <p:cNvPr id="114" name="Shape 114"/>
+        <p:cNvPr id="115" name="Shape 115"/>
         <p:cNvGrpSpPr/>
         <p:nvPr/>
       </p:nvGrpSpPr>
@@ -15438,7 +15671,7 @@
       </p:grpSpPr>
       <p:sp>
         <p:nvSpPr>
-          <p:cNvPr id="115" name="Google Shape;115;p8"/>
+          <p:cNvPr id="116" name="Google Shape;116;p8"/>
           <p:cNvSpPr/>
           <p:nvPr/>
         </p:nvSpPr>
@@ -15499,7 +15732,7 @@
       </p:sp>
       <p:sp>
         <p:nvSpPr>
-          <p:cNvPr id="116" name="Google Shape;116;p8"/>
+          <p:cNvPr id="117" name="Google Shape;117;p8"/>
           <p:cNvSpPr/>
           <p:nvPr/>
         </p:nvSpPr>
@@ -15578,7 +15811,7 @@
       </p:sp>
       <p:sp>
         <p:nvSpPr>
-          <p:cNvPr id="117" name="Google Shape;117;p8"/>
+          <p:cNvPr id="118" name="Google Shape;118;p8"/>
           <p:cNvSpPr/>
           <p:nvPr/>
         </p:nvSpPr>
@@ -15657,7 +15890,7 @@
       </p:sp>
       <p:sp>
         <p:nvSpPr>
-          <p:cNvPr id="118" name="Google Shape;118;p8"/>
+          <p:cNvPr id="119" name="Google Shape;119;p8"/>
           <p:cNvSpPr/>
           <p:nvPr/>
         </p:nvSpPr>
@@ -15718,7 +15951,7 @@
       </p:sp>
       <p:sp>
         <p:nvSpPr>
-          <p:cNvPr id="119" name="Google Shape;119;p8"/>
+          <p:cNvPr id="120" name="Google Shape;120;p8"/>
           <p:cNvSpPr/>
           <p:nvPr/>
         </p:nvSpPr>
@@ -15779,7 +16012,7 @@
       </p:sp>
       <p:sp>
         <p:nvSpPr>
-          <p:cNvPr id="120" name="Google Shape;120;p8"/>
+          <p:cNvPr id="121" name="Google Shape;121;p8"/>
           <p:cNvSpPr/>
           <p:nvPr/>
         </p:nvSpPr>
@@ -15866,7 +16099,7 @@
       </p:sp>
       <p:sp>
         <p:nvSpPr>
-          <p:cNvPr id="121" name="Google Shape;121;p8"/>
+          <p:cNvPr id="122" name="Google Shape;122;p8"/>
           <p:cNvSpPr/>
           <p:nvPr/>
         </p:nvSpPr>
@@ -15927,7 +16160,7 @@
       </p:sp>
       <p:sp>
         <p:nvSpPr>
-          <p:cNvPr id="122" name="Google Shape;122;p8"/>
+          <p:cNvPr id="123" name="Google Shape;123;p8"/>
           <p:cNvSpPr/>
           <p:nvPr/>
         </p:nvSpPr>
@@ -15988,7 +16221,7 @@
       </p:sp>
       <p:sp>
         <p:nvSpPr>
-          <p:cNvPr id="123" name="Google Shape;123;p8"/>
+          <p:cNvPr id="124" name="Google Shape;124;p8"/>
           <p:cNvSpPr/>
           <p:nvPr/>
         </p:nvSpPr>
@@ -16049,7 +16282,7 @@
       </p:sp>
       <p:sp>
         <p:nvSpPr>
-          <p:cNvPr id="124" name="Google Shape;124;p8"/>
+          <p:cNvPr id="125" name="Google Shape;125;p8"/>
           <p:cNvSpPr/>
           <p:nvPr/>
         </p:nvSpPr>
@@ -16110,7 +16343,7 @@
       </p:sp>
       <p:sp>
         <p:nvSpPr>
-          <p:cNvPr id="125" name="Google Shape;125;p8"/>
+          <p:cNvPr id="126" name="Google Shape;126;p8"/>
           <p:cNvSpPr/>
           <p:nvPr/>
         </p:nvSpPr>
@@ -16175,7 +16408,7 @@
       </p:sp>
       <p:pic>
         <p:nvPicPr>
-          <p:cNvPr descr="/uploadFile/125_2.jpg" id="126" name="Google Shape;126;p8"/>
+          <p:cNvPr descr="/uploadFile/125_2.jpg" id="127" name="Google Shape;127;p8"/>
           <p:cNvPicPr preferRelativeResize="0"/>
           <p:nvPr/>
         </p:nvPicPr>
@@ -16204,7 +16437,7 @@
       </p:pic>
       <p:pic>
         <p:nvPicPr>
-          <p:cNvPr descr="/uploadFile/125_2.jpg" id="127" name="Google Shape;127;p8"/>
+          <p:cNvPr descr="/uploadFile/125_2.jpg" id="128" name="Google Shape;128;p8"/>
           <p:cNvPicPr preferRelativeResize="0"/>
           <p:nvPr/>
         </p:nvPicPr>
@@ -16233,7 +16466,7 @@
       </p:pic>
       <p:pic>
         <p:nvPicPr>
-          <p:cNvPr descr="/uploadFile/125_2.jpg" id="128" name="Google Shape;128;p8"/>
+          <p:cNvPr descr="/uploadFile/125_2.jpg" id="129" name="Google Shape;129;p8"/>
           <p:cNvPicPr preferRelativeResize="0"/>
           <p:nvPr/>
         </p:nvPicPr>
@@ -16280,7 +16513,7 @@
     </p:bg>
     <p:spTree>
       <p:nvGrpSpPr>
-        <p:cNvPr id="133" name="Shape 133"/>
+        <p:cNvPr id="134" name="Shape 134"/>
         <p:cNvGrpSpPr/>
         <p:nvPr/>
       </p:nvGrpSpPr>
@@ -16294,7 +16527,7 @@
       </p:grpSpPr>
       <p:sp>
         <p:nvSpPr>
-          <p:cNvPr id="134" name="Google Shape;134;p9"/>
+          <p:cNvPr id="135" name="Google Shape;135;p9"/>
           <p:cNvSpPr/>
           <p:nvPr/>
         </p:nvSpPr>
@@ -16362,7 +16595,7 @@
       </p:sp>
       <p:sp>
         <p:nvSpPr>
-          <p:cNvPr id="135" name="Google Shape;135;p9"/>
+          <p:cNvPr id="136" name="Google Shape;136;p9"/>
           <p:cNvSpPr/>
           <p:nvPr/>
         </p:nvSpPr>
@@ -16423,7 +16656,7 @@
       </p:sp>
       <p:pic>
         <p:nvPicPr>
-          <p:cNvPr descr="/uploadFile/125_2.jpg" id="136" name="Google Shape;136;p9"/>
+          <p:cNvPr descr="/uploadFile/125_2.jpg" id="137" name="Google Shape;137;p9"/>
           <p:cNvPicPr preferRelativeResize="0"/>
           <p:nvPr/>
         </p:nvPicPr>

</xml_diff>